<commit_message>
update all presentation for Toronto 2015 CBW course
</commit_message>
<xml_diff>
--- a/LectureFiles/cbw/2015/RNASeq_Module0_AmazonPreTutorial.pptx
+++ b/LectureFiles/cbw/2015/RNASeq_Module0_AmazonPreTutorial.pptx
@@ -4433,6 +4433,13 @@
   <p:clrMapOvr>
     <a:masterClrMapping/>
   </p:clrMapOvr>
+  <p:timing>
+    <p:tnLst>
+      <p:par>
+        <p:cTn xmlns:p14="http://schemas.microsoft.com/office/powerpoint/2010/main" id="1" dur="indefinite" restart="never" nodeType="tmRoot"/>
+      </p:par>
+    </p:tnLst>
+  </p:timing>
 </p:sld>
 </file>
 
@@ -4474,7 +4481,7 @@
           <a:lstStyle/>
           <a:p>
             <a:r>
-              <a:rPr lang="en-US" sz="2800">
+              <a:rPr lang="en-US" sz="3600" dirty="0">
                 <a:ea typeface="ＭＳ Ｐゴシック" charset="0"/>
               </a:rPr>
               <a:t>Some of the challenges of cloud computing:</a:t>
@@ -4627,7 +4634,7 @@
           <a:lstStyle/>
           <a:p>
             <a:r>
-              <a:rPr lang="en-US" sz="2800">
+              <a:rPr lang="en-US" sz="3600" dirty="0">
                 <a:ea typeface="ＭＳ Ｐゴシック" charset="0"/>
               </a:rPr>
               <a:t>Some of the advantages of cloud computing:</a:t>
@@ -5066,7 +5073,7 @@
           <a:lstStyle/>
           <a:p>
             <a:r>
-              <a:rPr lang="en-US">
+              <a:rPr lang="en-US" dirty="0">
                 <a:ea typeface="ＭＳ Ｐゴシック" charset="0"/>
               </a:rPr>
               <a:t>In this workshop:</a:t>
@@ -5587,7 +5594,7 @@
           <a:lstStyle/>
           <a:p>
             <a:r>
-              <a:rPr lang="en-US">
+              <a:rPr lang="en-US" dirty="0">
                 <a:ea typeface="ＭＳ Ｐゴシック" charset="0"/>
               </a:rPr>
               <a:t>Things we have set up:</a:t>
@@ -6045,14 +6052,7 @@
                 <a:latin typeface="Calibri"/>
                 <a:cs typeface="Calibri"/>
               </a:rPr>
-              <a:t>Login</a:t>
-            </a:r>
-            <a:r>
-              <a:rPr lang="en-US" sz="2800" dirty="0" smtClean="0">
-                <a:latin typeface="Calibri"/>
-                <a:cs typeface="Calibri"/>
-              </a:rPr>
-              <a:t>: </a:t>
+              <a:t>Login: </a:t>
             </a:r>
             <a:r>
               <a:rPr lang="en-US" sz="2800" dirty="0" err="1">
@@ -6633,7 +6633,7 @@
           <a:lstStyle/>
           <a:p>
             <a:r>
-              <a:rPr lang="en-US">
+              <a:rPr lang="en-US" dirty="0">
                 <a:ea typeface="ＭＳ Ｐゴシック" charset="0"/>
               </a:rPr>
               <a:t>Macintosh users</a:t>
@@ -10129,7 +10129,7 @@
           <a:lstStyle/>
           <a:p>
             <a:r>
-              <a:rPr lang="en-US">
+              <a:rPr lang="en-US" dirty="0">
                 <a:ea typeface="ＭＳ Ｐゴシック" charset="0"/>
               </a:rPr>
               <a:t>So, at this point:</a:t>
@@ -10854,22 +10854,7 @@
                 <a:ea typeface="+mn-ea"/>
                 <a:cs typeface="Calibri"/>
               </a:rPr>
-              <a:t>June 8-9, </a:t>
-            </a:r>
-            <a:r>
-              <a:rPr lang="en-US" sz="1400" dirty="0" smtClean="0">
-                <a:ln w="1270">
-                  <a:solidFill>
-                    <a:schemeClr val="tx1">
-                      <a:alpha val="38000"/>
-                    </a:schemeClr>
-                  </a:solidFill>
-                </a:ln>
-                <a:latin typeface="Calibri"/>
-                <a:ea typeface="+mn-ea"/>
-                <a:cs typeface="Calibri"/>
-              </a:rPr>
-              <a:t>2015</a:t>
+              <a:t>June 8-9, 2015</a:t>
             </a:r>
           </a:p>
         </p:txBody>
@@ -11011,7 +10996,7 @@
           <a:lstStyle/>
           <a:p>
             <a:r>
-              <a:rPr lang="en-US">
+              <a:rPr lang="en-US" dirty="0">
                 <a:latin typeface="Calibri" charset="0"/>
                 <a:ea typeface="ＭＳ Ｐゴシック" charset="0"/>
               </a:rPr>
@@ -11248,6 +11233,13 @@
   <p:clrMapOvr>
     <a:masterClrMapping/>
   </p:clrMapOvr>
+  <p:timing>
+    <p:tnLst>
+      <p:par>
+        <p:cTn xmlns:p14="http://schemas.microsoft.com/office/powerpoint/2010/main" id="1" dur="indefinite" restart="never" nodeType="tmRoot"/>
+      </p:par>
+    </p:tnLst>
+  </p:timing>
 </p:sld>
 </file>
 
@@ -11298,13 +11290,7 @@
               <a:rPr lang="en-US" dirty="0" smtClean="0">
                 <a:ea typeface="ＭＳ Ｐゴシック" charset="0"/>
               </a:rPr>
-              <a:t>module </a:t>
-            </a:r>
-            <a:r>
-              <a:rPr lang="en-US" dirty="0" smtClean="0">
-                <a:ea typeface="ＭＳ Ｐゴシック" charset="0"/>
-              </a:rPr>
-              <a:t>0</a:t>
+              <a:t>module 0</a:t>
             </a:r>
             <a:endParaRPr lang="en-US" dirty="0">
               <a:ea typeface="ＭＳ Ｐゴシック" charset="0"/>
@@ -11339,7 +11325,19 @@
               <a:rPr lang="en-US" dirty="0">
                 <a:ea typeface="ＭＳ Ｐゴシック" charset="0"/>
               </a:rPr>
-              <a:t>Use of the wiki in this workshop</a:t>
+              <a:t>Use of the </a:t>
+            </a:r>
+            <a:r>
+              <a:rPr lang="en-US" dirty="0" smtClean="0">
+                <a:ea typeface="ＭＳ Ｐゴシック" charset="0"/>
+              </a:rPr>
+              <a:t>wiki(s) </a:t>
+            </a:r>
+            <a:r>
+              <a:rPr lang="en-US" dirty="0">
+                <a:ea typeface="ＭＳ Ｐゴシック" charset="0"/>
+              </a:rPr>
+              <a:t>in this workshop</a:t>
             </a:r>
           </a:p>
           <a:p>
@@ -23217,16 +23215,36 @@
           <a:p>
             <a:pPr algn="ctr"/>
             <a:r>
-              <a:rPr lang="en-US" b="1">
+              <a:rPr lang="en-US" sz="3200" b="1" dirty="0">
                 <a:solidFill>
                   <a:srgbClr val="1A1A1A"/>
                 </a:solidFill>
                 <a:latin typeface="Calibri"/>
                 <a:cs typeface="Calibri"/>
               </a:rPr>
-              <a:t>Disk Capacity vs Sequencing Capacity, 1990-2012</a:t>
-            </a:r>
-            <a:endParaRPr lang="en-US" b="1">
+              <a:t>Disk Capacity </a:t>
+            </a:r>
+            <a:r>
+              <a:rPr lang="en-US" sz="3200" b="1" dirty="0" err="1">
+                <a:solidFill>
+                  <a:srgbClr val="1A1A1A"/>
+                </a:solidFill>
+                <a:latin typeface="Calibri"/>
+                <a:cs typeface="Calibri"/>
+              </a:rPr>
+              <a:t>vs</a:t>
+            </a:r>
+            <a:r>
+              <a:rPr lang="en-US" sz="3200" b="1" dirty="0">
+                <a:solidFill>
+                  <a:srgbClr val="1A1A1A"/>
+                </a:solidFill>
+                <a:latin typeface="Calibri"/>
+                <a:cs typeface="Calibri"/>
+              </a:rPr>
+              <a:t> Sequencing Capacity, 1990-2012</a:t>
+            </a:r>
+            <a:endParaRPr lang="en-US" sz="3200" b="1" dirty="0">
               <a:latin typeface="Calibri"/>
               <a:cs typeface="Calibri"/>
             </a:endParaRPr>
@@ -23422,7 +23440,7 @@
           <a:p>
             <a:pPr eaLnBrk="1"/>
             <a:r>
-              <a:rPr lang="en-US" sz="3200" dirty="0">
+              <a:rPr lang="en-US" dirty="0">
                 <a:ea typeface="ＭＳ Ｐゴシック" charset="0"/>
               </a:rPr>
               <a:t>About DNA and computers</a:t>
@@ -23456,7 +23474,7 @@
               <a:rPr lang="en-US" dirty="0" smtClean="0">
                 <a:ea typeface="ＭＳ Ｐゴシック" charset="0"/>
               </a:rPr>
-              <a:t>2014-</a:t>
+              <a:t>2015-</a:t>
             </a:r>
             <a:r>
               <a:rPr lang="en-US" dirty="0">
@@ -23567,7 +23585,7 @@
           <a:lstStyle/>
           <a:p>
             <a:r>
-              <a:rPr lang="en-US">
+              <a:rPr lang="en-US" dirty="0">
                 <a:ea typeface="ＭＳ Ｐゴシック" charset="0"/>
               </a:rPr>
               <a:t>What is the general biomedical scientist to do?</a:t>
@@ -23694,7 +23712,7 @@
           <a:lstStyle/>
           <a:p>
             <a:r>
-              <a:rPr lang="en-US">
+              <a:rPr lang="en-US" dirty="0">
                 <a:ea typeface="ＭＳ Ｐゴシック" charset="0"/>
               </a:rPr>
               <a:t>Amazon Web Services (AWS)</a:t>

</xml_diff>

<commit_message>
correction to AWS connect instructions
</commit_message>
<xml_diff>
--- a/LectureFiles/cbw/2015/RNASeq_Module0_AmazonPreTutorial.pptx
+++ b/LectureFiles/cbw/2015/RNASeq_Module0_AmazonPreTutorial.pptx
@@ -282,7 +282,7 @@
               <a:pPr>
                 <a:defRPr/>
               </a:pPr>
-              <a:t>6/3/15</a:t>
+              <a:t>6/8/15</a:t>
             </a:fld>
             <a:endParaRPr lang="en-US"/>
           </a:p>
@@ -497,7 +497,7 @@
               <a:pPr>
                 <a:defRPr/>
               </a:pPr>
-              <a:t>6/3/15</a:t>
+              <a:t>6/8/15</a:t>
             </a:fld>
             <a:endParaRPr lang="en-US"/>
           </a:p>
@@ -826,6 +826,1986 @@
 <file path=ppt/notesSlides/notesSlide1.xml><?xml version="1.0" encoding="utf-8"?>
 <p:notes xmlns:a="http://schemas.openxmlformats.org/drawingml/2006/main" xmlns:r="http://schemas.openxmlformats.org/officeDocument/2006/relationships" xmlns:p="http://schemas.openxmlformats.org/presentationml/2006/main">
   <p:cSld>
+    <p:spTree>
+      <p:nvGrpSpPr>
+        <p:cNvPr id="1" name=""/>
+        <p:cNvGrpSpPr/>
+        <p:nvPr/>
+      </p:nvGrpSpPr>
+      <p:grpSpPr>
+        <a:xfrm>
+          <a:off x="0" y="0"/>
+          <a:ext cx="0" cy="0"/>
+          <a:chOff x="0" y="0"/>
+          <a:chExt cx="0" cy="0"/>
+        </a:xfrm>
+      </p:grpSpPr>
+      <p:sp>
+        <p:nvSpPr>
+          <p:cNvPr id="2" name="Slide Image Placeholder 1"/>
+          <p:cNvSpPr>
+            <a:spLocks noGrp="1" noRot="1" noChangeAspect="1"/>
+          </p:cNvSpPr>
+          <p:nvPr>
+            <p:ph type="sldImg"/>
+          </p:nvPr>
+        </p:nvSpPr>
+        <p:spPr/>
+      </p:sp>
+      <p:sp>
+        <p:nvSpPr>
+          <p:cNvPr id="3" name="Notes Placeholder 2"/>
+          <p:cNvSpPr>
+            <a:spLocks noGrp="1"/>
+          </p:cNvSpPr>
+          <p:nvPr>
+            <p:ph type="body" idx="1"/>
+          </p:nvPr>
+        </p:nvSpPr>
+        <p:spPr/>
+        <p:txBody>
+          <a:bodyPr/>
+          <a:lstStyle/>
+          <a:p>
+            <a:endParaRPr lang="en-US"/>
+          </a:p>
+        </p:txBody>
+      </p:sp>
+      <p:sp>
+        <p:nvSpPr>
+          <p:cNvPr id="4" name="Slide Number Placeholder 3"/>
+          <p:cNvSpPr>
+            <a:spLocks noGrp="1"/>
+          </p:cNvSpPr>
+          <p:nvPr>
+            <p:ph type="sldNum" sz="quarter" idx="10"/>
+          </p:nvPr>
+        </p:nvSpPr>
+        <p:spPr/>
+        <p:txBody>
+          <a:bodyPr/>
+          <a:lstStyle/>
+          <a:p>
+            <a:pPr>
+              <a:defRPr/>
+            </a:pPr>
+            <a:fld id="{F3969550-FBCF-404B-9FAA-7B1DCDF2C4FF}" type="slidenum">
+              <a:rPr lang="en-US" smtClean="0"/>
+              <a:pPr>
+                <a:defRPr/>
+              </a:pPr>
+              <a:t>1</a:t>
+            </a:fld>
+            <a:endParaRPr lang="en-US"/>
+          </a:p>
+        </p:txBody>
+      </p:sp>
+    </p:spTree>
+    <p:extLst>
+      <p:ext uri="{BB962C8B-B14F-4D97-AF65-F5344CB8AC3E}">
+        <p14:creationId xmlns:p14="http://schemas.microsoft.com/office/powerpoint/2010/main" val="2269821114"/>
+      </p:ext>
+    </p:extLst>
+  </p:cSld>
+  <p:clrMapOvr>
+    <a:masterClrMapping/>
+  </p:clrMapOvr>
+</p:notes>
+</file>
+
+<file path=ppt/notesSlides/notesSlide10.xml><?xml version="1.0" encoding="utf-8"?>
+<p:notes xmlns:a="http://schemas.openxmlformats.org/drawingml/2006/main" xmlns:r="http://schemas.openxmlformats.org/officeDocument/2006/relationships" xmlns:p="http://schemas.openxmlformats.org/presentationml/2006/main">
+  <p:cSld>
+    <p:spTree>
+      <p:nvGrpSpPr>
+        <p:cNvPr id="1" name=""/>
+        <p:cNvGrpSpPr/>
+        <p:nvPr/>
+      </p:nvGrpSpPr>
+      <p:grpSpPr>
+        <a:xfrm>
+          <a:off x="0" y="0"/>
+          <a:ext cx="0" cy="0"/>
+          <a:chOff x="0" y="0"/>
+          <a:chExt cx="0" cy="0"/>
+        </a:xfrm>
+      </p:grpSpPr>
+      <p:sp>
+        <p:nvSpPr>
+          <p:cNvPr id="2" name="Slide Image Placeholder 1"/>
+          <p:cNvSpPr>
+            <a:spLocks noGrp="1" noRot="1" noChangeAspect="1"/>
+          </p:cNvSpPr>
+          <p:nvPr>
+            <p:ph type="sldImg"/>
+          </p:nvPr>
+        </p:nvSpPr>
+        <p:spPr/>
+      </p:sp>
+      <p:sp>
+        <p:nvSpPr>
+          <p:cNvPr id="3" name="Notes Placeholder 2"/>
+          <p:cNvSpPr>
+            <a:spLocks noGrp="1"/>
+          </p:cNvSpPr>
+          <p:nvPr>
+            <p:ph type="body" idx="1"/>
+          </p:nvPr>
+        </p:nvSpPr>
+        <p:spPr/>
+        <p:txBody>
+          <a:bodyPr/>
+          <a:lstStyle/>
+          <a:p>
+            <a:endParaRPr lang="en-US"/>
+          </a:p>
+        </p:txBody>
+      </p:sp>
+      <p:sp>
+        <p:nvSpPr>
+          <p:cNvPr id="4" name="Slide Number Placeholder 3"/>
+          <p:cNvSpPr>
+            <a:spLocks noGrp="1"/>
+          </p:cNvSpPr>
+          <p:nvPr>
+            <p:ph type="sldNum" sz="quarter" idx="10"/>
+          </p:nvPr>
+        </p:nvSpPr>
+        <p:spPr/>
+        <p:txBody>
+          <a:bodyPr/>
+          <a:lstStyle/>
+          <a:p>
+            <a:pPr>
+              <a:defRPr/>
+            </a:pPr>
+            <a:fld id="{F3969550-FBCF-404B-9FAA-7B1DCDF2C4FF}" type="slidenum">
+              <a:rPr lang="en-US" smtClean="0"/>
+              <a:pPr>
+                <a:defRPr/>
+              </a:pPr>
+              <a:t>10</a:t>
+            </a:fld>
+            <a:endParaRPr lang="en-US"/>
+          </a:p>
+        </p:txBody>
+      </p:sp>
+    </p:spTree>
+    <p:extLst>
+      <p:ext uri="{BB962C8B-B14F-4D97-AF65-F5344CB8AC3E}">
+        <p14:creationId xmlns:p14="http://schemas.microsoft.com/office/powerpoint/2010/main" val="2446343937"/>
+      </p:ext>
+    </p:extLst>
+  </p:cSld>
+  <p:clrMapOvr>
+    <a:masterClrMapping/>
+  </p:clrMapOvr>
+</p:notes>
+</file>
+
+<file path=ppt/notesSlides/notesSlide11.xml><?xml version="1.0" encoding="utf-8"?>
+<p:notes xmlns:a="http://schemas.openxmlformats.org/drawingml/2006/main" xmlns:r="http://schemas.openxmlformats.org/officeDocument/2006/relationships" xmlns:p="http://schemas.openxmlformats.org/presentationml/2006/main">
+  <p:cSld>
+    <p:spTree>
+      <p:nvGrpSpPr>
+        <p:cNvPr id="1" name=""/>
+        <p:cNvGrpSpPr/>
+        <p:nvPr/>
+      </p:nvGrpSpPr>
+      <p:grpSpPr>
+        <a:xfrm>
+          <a:off x="0" y="0"/>
+          <a:ext cx="0" cy="0"/>
+          <a:chOff x="0" y="0"/>
+          <a:chExt cx="0" cy="0"/>
+        </a:xfrm>
+      </p:grpSpPr>
+      <p:sp>
+        <p:nvSpPr>
+          <p:cNvPr id="2" name="Slide Image Placeholder 1"/>
+          <p:cNvSpPr>
+            <a:spLocks noGrp="1" noRot="1" noChangeAspect="1"/>
+          </p:cNvSpPr>
+          <p:nvPr>
+            <p:ph type="sldImg"/>
+          </p:nvPr>
+        </p:nvSpPr>
+        <p:spPr/>
+      </p:sp>
+      <p:sp>
+        <p:nvSpPr>
+          <p:cNvPr id="3" name="Notes Placeholder 2"/>
+          <p:cNvSpPr>
+            <a:spLocks noGrp="1"/>
+          </p:cNvSpPr>
+          <p:nvPr>
+            <p:ph type="body" idx="1"/>
+          </p:nvPr>
+        </p:nvSpPr>
+        <p:spPr/>
+        <p:txBody>
+          <a:bodyPr/>
+          <a:lstStyle/>
+          <a:p>
+            <a:endParaRPr lang="en-US"/>
+          </a:p>
+        </p:txBody>
+      </p:sp>
+      <p:sp>
+        <p:nvSpPr>
+          <p:cNvPr id="4" name="Slide Number Placeholder 3"/>
+          <p:cNvSpPr>
+            <a:spLocks noGrp="1"/>
+          </p:cNvSpPr>
+          <p:nvPr>
+            <p:ph type="sldNum" sz="quarter" idx="10"/>
+          </p:nvPr>
+        </p:nvSpPr>
+        <p:spPr/>
+        <p:txBody>
+          <a:bodyPr/>
+          <a:lstStyle/>
+          <a:p>
+            <a:pPr>
+              <a:defRPr/>
+            </a:pPr>
+            <a:fld id="{F3969550-FBCF-404B-9FAA-7B1DCDF2C4FF}" type="slidenum">
+              <a:rPr lang="en-US" smtClean="0"/>
+              <a:pPr>
+                <a:defRPr/>
+              </a:pPr>
+              <a:t>11</a:t>
+            </a:fld>
+            <a:endParaRPr lang="en-US"/>
+          </a:p>
+        </p:txBody>
+      </p:sp>
+    </p:spTree>
+    <p:extLst>
+      <p:ext uri="{BB962C8B-B14F-4D97-AF65-F5344CB8AC3E}">
+        <p14:creationId xmlns:p14="http://schemas.microsoft.com/office/powerpoint/2010/main" val="3388518528"/>
+      </p:ext>
+    </p:extLst>
+  </p:cSld>
+  <p:clrMapOvr>
+    <a:masterClrMapping/>
+  </p:clrMapOvr>
+</p:notes>
+</file>
+
+<file path=ppt/notesSlides/notesSlide12.xml><?xml version="1.0" encoding="utf-8"?>
+<p:notes xmlns:a="http://schemas.openxmlformats.org/drawingml/2006/main" xmlns:r="http://schemas.openxmlformats.org/officeDocument/2006/relationships" xmlns:p="http://schemas.openxmlformats.org/presentationml/2006/main">
+  <p:cSld>
+    <p:spTree>
+      <p:nvGrpSpPr>
+        <p:cNvPr id="1" name=""/>
+        <p:cNvGrpSpPr/>
+        <p:nvPr/>
+      </p:nvGrpSpPr>
+      <p:grpSpPr>
+        <a:xfrm>
+          <a:off x="0" y="0"/>
+          <a:ext cx="0" cy="0"/>
+          <a:chOff x="0" y="0"/>
+          <a:chExt cx="0" cy="0"/>
+        </a:xfrm>
+      </p:grpSpPr>
+      <p:sp>
+        <p:nvSpPr>
+          <p:cNvPr id="2" name="Slide Image Placeholder 1"/>
+          <p:cNvSpPr>
+            <a:spLocks noGrp="1" noRot="1" noChangeAspect="1"/>
+          </p:cNvSpPr>
+          <p:nvPr>
+            <p:ph type="sldImg"/>
+          </p:nvPr>
+        </p:nvSpPr>
+        <p:spPr/>
+      </p:sp>
+      <p:sp>
+        <p:nvSpPr>
+          <p:cNvPr id="3" name="Notes Placeholder 2"/>
+          <p:cNvSpPr>
+            <a:spLocks noGrp="1"/>
+          </p:cNvSpPr>
+          <p:nvPr>
+            <p:ph type="body" idx="1"/>
+          </p:nvPr>
+        </p:nvSpPr>
+        <p:spPr/>
+        <p:txBody>
+          <a:bodyPr/>
+          <a:lstStyle/>
+          <a:p>
+            <a:endParaRPr lang="en-US"/>
+          </a:p>
+        </p:txBody>
+      </p:sp>
+      <p:sp>
+        <p:nvSpPr>
+          <p:cNvPr id="4" name="Slide Number Placeholder 3"/>
+          <p:cNvSpPr>
+            <a:spLocks noGrp="1"/>
+          </p:cNvSpPr>
+          <p:nvPr>
+            <p:ph type="sldNum" sz="quarter" idx="10"/>
+          </p:nvPr>
+        </p:nvSpPr>
+        <p:spPr/>
+        <p:txBody>
+          <a:bodyPr/>
+          <a:lstStyle/>
+          <a:p>
+            <a:pPr>
+              <a:defRPr/>
+            </a:pPr>
+            <a:fld id="{F3969550-FBCF-404B-9FAA-7B1DCDF2C4FF}" type="slidenum">
+              <a:rPr lang="en-US" smtClean="0"/>
+              <a:pPr>
+                <a:defRPr/>
+              </a:pPr>
+              <a:t>12</a:t>
+            </a:fld>
+            <a:endParaRPr lang="en-US"/>
+          </a:p>
+        </p:txBody>
+      </p:sp>
+    </p:spTree>
+    <p:extLst>
+      <p:ext uri="{BB962C8B-B14F-4D97-AF65-F5344CB8AC3E}">
+        <p14:creationId xmlns:p14="http://schemas.microsoft.com/office/powerpoint/2010/main" val="3643682768"/>
+      </p:ext>
+    </p:extLst>
+  </p:cSld>
+  <p:clrMapOvr>
+    <a:masterClrMapping/>
+  </p:clrMapOvr>
+</p:notes>
+</file>
+
+<file path=ppt/notesSlides/notesSlide13.xml><?xml version="1.0" encoding="utf-8"?>
+<p:notes xmlns:a="http://schemas.openxmlformats.org/drawingml/2006/main" xmlns:r="http://schemas.openxmlformats.org/officeDocument/2006/relationships" xmlns:p="http://schemas.openxmlformats.org/presentationml/2006/main">
+  <p:cSld>
+    <p:spTree>
+      <p:nvGrpSpPr>
+        <p:cNvPr id="1" name=""/>
+        <p:cNvGrpSpPr/>
+        <p:nvPr/>
+      </p:nvGrpSpPr>
+      <p:grpSpPr>
+        <a:xfrm>
+          <a:off x="0" y="0"/>
+          <a:ext cx="0" cy="0"/>
+          <a:chOff x="0" y="0"/>
+          <a:chExt cx="0" cy="0"/>
+        </a:xfrm>
+      </p:grpSpPr>
+      <p:sp>
+        <p:nvSpPr>
+          <p:cNvPr id="2" name="Slide Image Placeholder 1"/>
+          <p:cNvSpPr>
+            <a:spLocks noGrp="1" noRot="1" noChangeAspect="1"/>
+          </p:cNvSpPr>
+          <p:nvPr>
+            <p:ph type="sldImg"/>
+          </p:nvPr>
+        </p:nvSpPr>
+        <p:spPr/>
+      </p:sp>
+      <p:sp>
+        <p:nvSpPr>
+          <p:cNvPr id="3" name="Notes Placeholder 2"/>
+          <p:cNvSpPr>
+            <a:spLocks noGrp="1"/>
+          </p:cNvSpPr>
+          <p:nvPr>
+            <p:ph type="body" idx="1"/>
+          </p:nvPr>
+        </p:nvSpPr>
+        <p:spPr/>
+        <p:txBody>
+          <a:bodyPr/>
+          <a:lstStyle/>
+          <a:p>
+            <a:endParaRPr lang="en-US"/>
+          </a:p>
+        </p:txBody>
+      </p:sp>
+      <p:sp>
+        <p:nvSpPr>
+          <p:cNvPr id="4" name="Slide Number Placeholder 3"/>
+          <p:cNvSpPr>
+            <a:spLocks noGrp="1"/>
+          </p:cNvSpPr>
+          <p:nvPr>
+            <p:ph type="sldNum" sz="quarter" idx="10"/>
+          </p:nvPr>
+        </p:nvSpPr>
+        <p:spPr/>
+        <p:txBody>
+          <a:bodyPr/>
+          <a:lstStyle/>
+          <a:p>
+            <a:pPr>
+              <a:defRPr/>
+            </a:pPr>
+            <a:fld id="{F3969550-FBCF-404B-9FAA-7B1DCDF2C4FF}" type="slidenum">
+              <a:rPr lang="en-US" smtClean="0"/>
+              <a:pPr>
+                <a:defRPr/>
+              </a:pPr>
+              <a:t>13</a:t>
+            </a:fld>
+            <a:endParaRPr lang="en-US"/>
+          </a:p>
+        </p:txBody>
+      </p:sp>
+    </p:spTree>
+    <p:extLst>
+      <p:ext uri="{BB962C8B-B14F-4D97-AF65-F5344CB8AC3E}">
+        <p14:creationId xmlns:p14="http://schemas.microsoft.com/office/powerpoint/2010/main" val="1317872593"/>
+      </p:ext>
+    </p:extLst>
+  </p:cSld>
+  <p:clrMapOvr>
+    <a:masterClrMapping/>
+  </p:clrMapOvr>
+</p:notes>
+</file>
+
+<file path=ppt/notesSlides/notesSlide14.xml><?xml version="1.0" encoding="utf-8"?>
+<p:notes xmlns:a="http://schemas.openxmlformats.org/drawingml/2006/main" xmlns:r="http://schemas.openxmlformats.org/officeDocument/2006/relationships" xmlns:p="http://schemas.openxmlformats.org/presentationml/2006/main">
+  <p:cSld>
+    <p:spTree>
+      <p:nvGrpSpPr>
+        <p:cNvPr id="1" name=""/>
+        <p:cNvGrpSpPr/>
+        <p:nvPr/>
+      </p:nvGrpSpPr>
+      <p:grpSpPr>
+        <a:xfrm>
+          <a:off x="0" y="0"/>
+          <a:ext cx="0" cy="0"/>
+          <a:chOff x="0" y="0"/>
+          <a:chExt cx="0" cy="0"/>
+        </a:xfrm>
+      </p:grpSpPr>
+      <p:sp>
+        <p:nvSpPr>
+          <p:cNvPr id="2" name="Slide Image Placeholder 1"/>
+          <p:cNvSpPr>
+            <a:spLocks noGrp="1" noRot="1" noChangeAspect="1"/>
+          </p:cNvSpPr>
+          <p:nvPr>
+            <p:ph type="sldImg"/>
+          </p:nvPr>
+        </p:nvSpPr>
+        <p:spPr/>
+      </p:sp>
+      <p:sp>
+        <p:nvSpPr>
+          <p:cNvPr id="3" name="Notes Placeholder 2"/>
+          <p:cNvSpPr>
+            <a:spLocks noGrp="1"/>
+          </p:cNvSpPr>
+          <p:nvPr>
+            <p:ph type="body" idx="1"/>
+          </p:nvPr>
+        </p:nvSpPr>
+        <p:spPr/>
+        <p:txBody>
+          <a:bodyPr/>
+          <a:lstStyle/>
+          <a:p>
+            <a:endParaRPr lang="en-US"/>
+          </a:p>
+        </p:txBody>
+      </p:sp>
+      <p:sp>
+        <p:nvSpPr>
+          <p:cNvPr id="4" name="Slide Number Placeholder 3"/>
+          <p:cNvSpPr>
+            <a:spLocks noGrp="1"/>
+          </p:cNvSpPr>
+          <p:nvPr>
+            <p:ph type="sldNum" sz="quarter" idx="10"/>
+          </p:nvPr>
+        </p:nvSpPr>
+        <p:spPr/>
+        <p:txBody>
+          <a:bodyPr/>
+          <a:lstStyle/>
+          <a:p>
+            <a:pPr>
+              <a:defRPr/>
+            </a:pPr>
+            <a:fld id="{F3969550-FBCF-404B-9FAA-7B1DCDF2C4FF}" type="slidenum">
+              <a:rPr lang="en-US" smtClean="0"/>
+              <a:pPr>
+                <a:defRPr/>
+              </a:pPr>
+              <a:t>14</a:t>
+            </a:fld>
+            <a:endParaRPr lang="en-US"/>
+          </a:p>
+        </p:txBody>
+      </p:sp>
+    </p:spTree>
+    <p:extLst>
+      <p:ext uri="{BB962C8B-B14F-4D97-AF65-F5344CB8AC3E}">
+        <p14:creationId xmlns:p14="http://schemas.microsoft.com/office/powerpoint/2010/main" val="2603642543"/>
+      </p:ext>
+    </p:extLst>
+  </p:cSld>
+  <p:clrMapOvr>
+    <a:masterClrMapping/>
+  </p:clrMapOvr>
+</p:notes>
+</file>
+
+<file path=ppt/notesSlides/notesSlide15.xml><?xml version="1.0" encoding="utf-8"?>
+<p:notes xmlns:a="http://schemas.openxmlformats.org/drawingml/2006/main" xmlns:r="http://schemas.openxmlformats.org/officeDocument/2006/relationships" xmlns:p="http://schemas.openxmlformats.org/presentationml/2006/main">
+  <p:cSld>
+    <p:spTree>
+      <p:nvGrpSpPr>
+        <p:cNvPr id="1" name=""/>
+        <p:cNvGrpSpPr/>
+        <p:nvPr/>
+      </p:nvGrpSpPr>
+      <p:grpSpPr>
+        <a:xfrm>
+          <a:off x="0" y="0"/>
+          <a:ext cx="0" cy="0"/>
+          <a:chOff x="0" y="0"/>
+          <a:chExt cx="0" cy="0"/>
+        </a:xfrm>
+      </p:grpSpPr>
+      <p:sp>
+        <p:nvSpPr>
+          <p:cNvPr id="2" name="Slide Image Placeholder 1"/>
+          <p:cNvSpPr>
+            <a:spLocks noGrp="1" noRot="1" noChangeAspect="1"/>
+          </p:cNvSpPr>
+          <p:nvPr>
+            <p:ph type="sldImg"/>
+          </p:nvPr>
+        </p:nvSpPr>
+        <p:spPr/>
+      </p:sp>
+      <p:sp>
+        <p:nvSpPr>
+          <p:cNvPr id="3" name="Notes Placeholder 2"/>
+          <p:cNvSpPr>
+            <a:spLocks noGrp="1"/>
+          </p:cNvSpPr>
+          <p:nvPr>
+            <p:ph type="body" idx="1"/>
+          </p:nvPr>
+        </p:nvSpPr>
+        <p:spPr/>
+        <p:txBody>
+          <a:bodyPr/>
+          <a:lstStyle/>
+          <a:p>
+            <a:endParaRPr lang="en-US"/>
+          </a:p>
+        </p:txBody>
+      </p:sp>
+      <p:sp>
+        <p:nvSpPr>
+          <p:cNvPr id="4" name="Slide Number Placeholder 3"/>
+          <p:cNvSpPr>
+            <a:spLocks noGrp="1"/>
+          </p:cNvSpPr>
+          <p:nvPr>
+            <p:ph type="sldNum" sz="quarter" idx="10"/>
+          </p:nvPr>
+        </p:nvSpPr>
+        <p:spPr/>
+        <p:txBody>
+          <a:bodyPr/>
+          <a:lstStyle/>
+          <a:p>
+            <a:pPr>
+              <a:defRPr/>
+            </a:pPr>
+            <a:fld id="{F3969550-FBCF-404B-9FAA-7B1DCDF2C4FF}" type="slidenum">
+              <a:rPr lang="en-US" smtClean="0"/>
+              <a:pPr>
+                <a:defRPr/>
+              </a:pPr>
+              <a:t>15</a:t>
+            </a:fld>
+            <a:endParaRPr lang="en-US"/>
+          </a:p>
+        </p:txBody>
+      </p:sp>
+    </p:spTree>
+    <p:extLst>
+      <p:ext uri="{BB962C8B-B14F-4D97-AF65-F5344CB8AC3E}">
+        <p14:creationId xmlns:p14="http://schemas.microsoft.com/office/powerpoint/2010/main" val="428508960"/>
+      </p:ext>
+    </p:extLst>
+  </p:cSld>
+  <p:clrMapOvr>
+    <a:masterClrMapping/>
+  </p:clrMapOvr>
+</p:notes>
+</file>
+
+<file path=ppt/notesSlides/notesSlide16.xml><?xml version="1.0" encoding="utf-8"?>
+<p:notes xmlns:a="http://schemas.openxmlformats.org/drawingml/2006/main" xmlns:r="http://schemas.openxmlformats.org/officeDocument/2006/relationships" xmlns:p="http://schemas.openxmlformats.org/presentationml/2006/main">
+  <p:cSld>
+    <p:spTree>
+      <p:nvGrpSpPr>
+        <p:cNvPr id="1" name=""/>
+        <p:cNvGrpSpPr/>
+        <p:nvPr/>
+      </p:nvGrpSpPr>
+      <p:grpSpPr>
+        <a:xfrm>
+          <a:off x="0" y="0"/>
+          <a:ext cx="0" cy="0"/>
+          <a:chOff x="0" y="0"/>
+          <a:chExt cx="0" cy="0"/>
+        </a:xfrm>
+      </p:grpSpPr>
+      <p:sp>
+        <p:nvSpPr>
+          <p:cNvPr id="2" name="Slide Image Placeholder 1"/>
+          <p:cNvSpPr>
+            <a:spLocks noGrp="1" noRot="1" noChangeAspect="1"/>
+          </p:cNvSpPr>
+          <p:nvPr>
+            <p:ph type="sldImg"/>
+          </p:nvPr>
+        </p:nvSpPr>
+        <p:spPr/>
+      </p:sp>
+      <p:sp>
+        <p:nvSpPr>
+          <p:cNvPr id="3" name="Notes Placeholder 2"/>
+          <p:cNvSpPr>
+            <a:spLocks noGrp="1"/>
+          </p:cNvSpPr>
+          <p:nvPr>
+            <p:ph type="body" idx="1"/>
+          </p:nvPr>
+        </p:nvSpPr>
+        <p:spPr/>
+        <p:txBody>
+          <a:bodyPr/>
+          <a:lstStyle/>
+          <a:p>
+            <a:endParaRPr lang="en-US"/>
+          </a:p>
+        </p:txBody>
+      </p:sp>
+      <p:sp>
+        <p:nvSpPr>
+          <p:cNvPr id="4" name="Slide Number Placeholder 3"/>
+          <p:cNvSpPr>
+            <a:spLocks noGrp="1"/>
+          </p:cNvSpPr>
+          <p:nvPr>
+            <p:ph type="sldNum" sz="quarter" idx="10"/>
+          </p:nvPr>
+        </p:nvSpPr>
+        <p:spPr/>
+        <p:txBody>
+          <a:bodyPr/>
+          <a:lstStyle/>
+          <a:p>
+            <a:pPr>
+              <a:defRPr/>
+            </a:pPr>
+            <a:fld id="{F3969550-FBCF-404B-9FAA-7B1DCDF2C4FF}" type="slidenum">
+              <a:rPr lang="en-US" smtClean="0"/>
+              <a:pPr>
+                <a:defRPr/>
+              </a:pPr>
+              <a:t>16</a:t>
+            </a:fld>
+            <a:endParaRPr lang="en-US"/>
+          </a:p>
+        </p:txBody>
+      </p:sp>
+    </p:spTree>
+    <p:extLst>
+      <p:ext uri="{BB962C8B-B14F-4D97-AF65-F5344CB8AC3E}">
+        <p14:creationId xmlns:p14="http://schemas.microsoft.com/office/powerpoint/2010/main" val="207433777"/>
+      </p:ext>
+    </p:extLst>
+  </p:cSld>
+  <p:clrMapOvr>
+    <a:masterClrMapping/>
+  </p:clrMapOvr>
+</p:notes>
+</file>
+
+<file path=ppt/notesSlides/notesSlide17.xml><?xml version="1.0" encoding="utf-8"?>
+<p:notes xmlns:a="http://schemas.openxmlformats.org/drawingml/2006/main" xmlns:r="http://schemas.openxmlformats.org/officeDocument/2006/relationships" xmlns:p="http://schemas.openxmlformats.org/presentationml/2006/main">
+  <p:cSld>
+    <p:spTree>
+      <p:nvGrpSpPr>
+        <p:cNvPr id="1" name=""/>
+        <p:cNvGrpSpPr/>
+        <p:nvPr/>
+      </p:nvGrpSpPr>
+      <p:grpSpPr>
+        <a:xfrm>
+          <a:off x="0" y="0"/>
+          <a:ext cx="0" cy="0"/>
+          <a:chOff x="0" y="0"/>
+          <a:chExt cx="0" cy="0"/>
+        </a:xfrm>
+      </p:grpSpPr>
+      <p:sp>
+        <p:nvSpPr>
+          <p:cNvPr id="2" name="Slide Image Placeholder 1"/>
+          <p:cNvSpPr>
+            <a:spLocks noGrp="1" noRot="1" noChangeAspect="1"/>
+          </p:cNvSpPr>
+          <p:nvPr>
+            <p:ph type="sldImg"/>
+          </p:nvPr>
+        </p:nvSpPr>
+        <p:spPr/>
+      </p:sp>
+      <p:sp>
+        <p:nvSpPr>
+          <p:cNvPr id="3" name="Notes Placeholder 2"/>
+          <p:cNvSpPr>
+            <a:spLocks noGrp="1"/>
+          </p:cNvSpPr>
+          <p:nvPr>
+            <p:ph type="body" idx="1"/>
+          </p:nvPr>
+        </p:nvSpPr>
+        <p:spPr/>
+        <p:txBody>
+          <a:bodyPr/>
+          <a:lstStyle/>
+          <a:p>
+            <a:endParaRPr lang="en-US"/>
+          </a:p>
+        </p:txBody>
+      </p:sp>
+      <p:sp>
+        <p:nvSpPr>
+          <p:cNvPr id="4" name="Slide Number Placeholder 3"/>
+          <p:cNvSpPr>
+            <a:spLocks noGrp="1"/>
+          </p:cNvSpPr>
+          <p:nvPr>
+            <p:ph type="sldNum" sz="quarter" idx="10"/>
+          </p:nvPr>
+        </p:nvSpPr>
+        <p:spPr/>
+        <p:txBody>
+          <a:bodyPr/>
+          <a:lstStyle/>
+          <a:p>
+            <a:pPr>
+              <a:defRPr/>
+            </a:pPr>
+            <a:fld id="{F3969550-FBCF-404B-9FAA-7B1DCDF2C4FF}" type="slidenum">
+              <a:rPr lang="en-US" smtClean="0"/>
+              <a:pPr>
+                <a:defRPr/>
+              </a:pPr>
+              <a:t>17</a:t>
+            </a:fld>
+            <a:endParaRPr lang="en-US"/>
+          </a:p>
+        </p:txBody>
+      </p:sp>
+    </p:spTree>
+    <p:extLst>
+      <p:ext uri="{BB962C8B-B14F-4D97-AF65-F5344CB8AC3E}">
+        <p14:creationId xmlns:p14="http://schemas.microsoft.com/office/powerpoint/2010/main" val="687861152"/>
+      </p:ext>
+    </p:extLst>
+  </p:cSld>
+  <p:clrMapOvr>
+    <a:masterClrMapping/>
+  </p:clrMapOvr>
+</p:notes>
+</file>
+
+<file path=ppt/notesSlides/notesSlide18.xml><?xml version="1.0" encoding="utf-8"?>
+<p:notes xmlns:a="http://schemas.openxmlformats.org/drawingml/2006/main" xmlns:r="http://schemas.openxmlformats.org/officeDocument/2006/relationships" xmlns:p="http://schemas.openxmlformats.org/presentationml/2006/main">
+  <p:cSld>
+    <p:spTree>
+      <p:nvGrpSpPr>
+        <p:cNvPr id="1" name=""/>
+        <p:cNvGrpSpPr/>
+        <p:nvPr/>
+      </p:nvGrpSpPr>
+      <p:grpSpPr>
+        <a:xfrm>
+          <a:off x="0" y="0"/>
+          <a:ext cx="0" cy="0"/>
+          <a:chOff x="0" y="0"/>
+          <a:chExt cx="0" cy="0"/>
+        </a:xfrm>
+      </p:grpSpPr>
+      <p:sp>
+        <p:nvSpPr>
+          <p:cNvPr id="2" name="Slide Image Placeholder 1"/>
+          <p:cNvSpPr>
+            <a:spLocks noGrp="1" noRot="1" noChangeAspect="1"/>
+          </p:cNvSpPr>
+          <p:nvPr>
+            <p:ph type="sldImg"/>
+          </p:nvPr>
+        </p:nvSpPr>
+        <p:spPr/>
+      </p:sp>
+      <p:sp>
+        <p:nvSpPr>
+          <p:cNvPr id="3" name="Notes Placeholder 2"/>
+          <p:cNvSpPr>
+            <a:spLocks noGrp="1"/>
+          </p:cNvSpPr>
+          <p:nvPr>
+            <p:ph type="body" idx="1"/>
+          </p:nvPr>
+        </p:nvSpPr>
+        <p:spPr/>
+        <p:txBody>
+          <a:bodyPr/>
+          <a:lstStyle/>
+          <a:p>
+            <a:endParaRPr lang="en-US"/>
+          </a:p>
+        </p:txBody>
+      </p:sp>
+      <p:sp>
+        <p:nvSpPr>
+          <p:cNvPr id="4" name="Slide Number Placeholder 3"/>
+          <p:cNvSpPr>
+            <a:spLocks noGrp="1"/>
+          </p:cNvSpPr>
+          <p:nvPr>
+            <p:ph type="sldNum" sz="quarter" idx="10"/>
+          </p:nvPr>
+        </p:nvSpPr>
+        <p:spPr/>
+        <p:txBody>
+          <a:bodyPr/>
+          <a:lstStyle/>
+          <a:p>
+            <a:pPr>
+              <a:defRPr/>
+            </a:pPr>
+            <a:fld id="{F3969550-FBCF-404B-9FAA-7B1DCDF2C4FF}" type="slidenum">
+              <a:rPr lang="en-US" smtClean="0"/>
+              <a:pPr>
+                <a:defRPr/>
+              </a:pPr>
+              <a:t>18</a:t>
+            </a:fld>
+            <a:endParaRPr lang="en-US"/>
+          </a:p>
+        </p:txBody>
+      </p:sp>
+    </p:spTree>
+    <p:extLst>
+      <p:ext uri="{BB962C8B-B14F-4D97-AF65-F5344CB8AC3E}">
+        <p14:creationId xmlns:p14="http://schemas.microsoft.com/office/powerpoint/2010/main" val="812437923"/>
+      </p:ext>
+    </p:extLst>
+  </p:cSld>
+  <p:clrMapOvr>
+    <a:masterClrMapping/>
+  </p:clrMapOvr>
+</p:notes>
+</file>
+
+<file path=ppt/notesSlides/notesSlide19.xml><?xml version="1.0" encoding="utf-8"?>
+<p:notes xmlns:a="http://schemas.openxmlformats.org/drawingml/2006/main" xmlns:r="http://schemas.openxmlformats.org/officeDocument/2006/relationships" xmlns:p="http://schemas.openxmlformats.org/presentationml/2006/main">
+  <p:cSld>
+    <p:spTree>
+      <p:nvGrpSpPr>
+        <p:cNvPr id="1" name=""/>
+        <p:cNvGrpSpPr/>
+        <p:nvPr/>
+      </p:nvGrpSpPr>
+      <p:grpSpPr>
+        <a:xfrm>
+          <a:off x="0" y="0"/>
+          <a:ext cx="0" cy="0"/>
+          <a:chOff x="0" y="0"/>
+          <a:chExt cx="0" cy="0"/>
+        </a:xfrm>
+      </p:grpSpPr>
+      <p:sp>
+        <p:nvSpPr>
+          <p:cNvPr id="2" name="Slide Image Placeholder 1"/>
+          <p:cNvSpPr>
+            <a:spLocks noGrp="1" noRot="1" noChangeAspect="1"/>
+          </p:cNvSpPr>
+          <p:nvPr>
+            <p:ph type="sldImg"/>
+          </p:nvPr>
+        </p:nvSpPr>
+        <p:spPr/>
+      </p:sp>
+      <p:sp>
+        <p:nvSpPr>
+          <p:cNvPr id="3" name="Notes Placeholder 2"/>
+          <p:cNvSpPr>
+            <a:spLocks noGrp="1"/>
+          </p:cNvSpPr>
+          <p:nvPr>
+            <p:ph type="body" idx="1"/>
+          </p:nvPr>
+        </p:nvSpPr>
+        <p:spPr/>
+        <p:txBody>
+          <a:bodyPr/>
+          <a:lstStyle/>
+          <a:p>
+            <a:endParaRPr lang="en-US"/>
+          </a:p>
+        </p:txBody>
+      </p:sp>
+      <p:sp>
+        <p:nvSpPr>
+          <p:cNvPr id="4" name="Slide Number Placeholder 3"/>
+          <p:cNvSpPr>
+            <a:spLocks noGrp="1"/>
+          </p:cNvSpPr>
+          <p:nvPr>
+            <p:ph type="sldNum" sz="quarter" idx="10"/>
+          </p:nvPr>
+        </p:nvSpPr>
+        <p:spPr/>
+        <p:txBody>
+          <a:bodyPr/>
+          <a:lstStyle/>
+          <a:p>
+            <a:pPr>
+              <a:defRPr/>
+            </a:pPr>
+            <a:fld id="{F3969550-FBCF-404B-9FAA-7B1DCDF2C4FF}" type="slidenum">
+              <a:rPr lang="en-US" smtClean="0"/>
+              <a:pPr>
+                <a:defRPr/>
+              </a:pPr>
+              <a:t>19</a:t>
+            </a:fld>
+            <a:endParaRPr lang="en-US"/>
+          </a:p>
+        </p:txBody>
+      </p:sp>
+    </p:spTree>
+    <p:extLst>
+      <p:ext uri="{BB962C8B-B14F-4D97-AF65-F5344CB8AC3E}">
+        <p14:creationId xmlns:p14="http://schemas.microsoft.com/office/powerpoint/2010/main" val="2815135364"/>
+      </p:ext>
+    </p:extLst>
+  </p:cSld>
+  <p:clrMapOvr>
+    <a:masterClrMapping/>
+  </p:clrMapOvr>
+</p:notes>
+</file>
+
+<file path=ppt/notesSlides/notesSlide2.xml><?xml version="1.0" encoding="utf-8"?>
+<p:notes xmlns:a="http://schemas.openxmlformats.org/drawingml/2006/main" xmlns:r="http://schemas.openxmlformats.org/officeDocument/2006/relationships" xmlns:p="http://schemas.openxmlformats.org/presentationml/2006/main">
+  <p:cSld>
+    <p:spTree>
+      <p:nvGrpSpPr>
+        <p:cNvPr id="1" name=""/>
+        <p:cNvGrpSpPr/>
+        <p:nvPr/>
+      </p:nvGrpSpPr>
+      <p:grpSpPr>
+        <a:xfrm>
+          <a:off x="0" y="0"/>
+          <a:ext cx="0" cy="0"/>
+          <a:chOff x="0" y="0"/>
+          <a:chExt cx="0" cy="0"/>
+        </a:xfrm>
+      </p:grpSpPr>
+      <p:sp>
+        <p:nvSpPr>
+          <p:cNvPr id="2" name="Slide Image Placeholder 1"/>
+          <p:cNvSpPr>
+            <a:spLocks noGrp="1" noRot="1" noChangeAspect="1"/>
+          </p:cNvSpPr>
+          <p:nvPr>
+            <p:ph type="sldImg"/>
+          </p:nvPr>
+        </p:nvSpPr>
+        <p:spPr/>
+      </p:sp>
+      <p:sp>
+        <p:nvSpPr>
+          <p:cNvPr id="3" name="Notes Placeholder 2"/>
+          <p:cNvSpPr>
+            <a:spLocks noGrp="1"/>
+          </p:cNvSpPr>
+          <p:nvPr>
+            <p:ph type="body" idx="1"/>
+          </p:nvPr>
+        </p:nvSpPr>
+        <p:spPr/>
+        <p:txBody>
+          <a:bodyPr/>
+          <a:lstStyle/>
+          <a:p>
+            <a:endParaRPr lang="en-US"/>
+          </a:p>
+        </p:txBody>
+      </p:sp>
+      <p:sp>
+        <p:nvSpPr>
+          <p:cNvPr id="4" name="Slide Number Placeholder 3"/>
+          <p:cNvSpPr>
+            <a:spLocks noGrp="1"/>
+          </p:cNvSpPr>
+          <p:nvPr>
+            <p:ph type="sldNum" sz="quarter" idx="10"/>
+          </p:nvPr>
+        </p:nvSpPr>
+        <p:spPr/>
+        <p:txBody>
+          <a:bodyPr/>
+          <a:lstStyle/>
+          <a:p>
+            <a:pPr>
+              <a:defRPr/>
+            </a:pPr>
+            <a:fld id="{F3969550-FBCF-404B-9FAA-7B1DCDF2C4FF}" type="slidenum">
+              <a:rPr lang="en-US" smtClean="0"/>
+              <a:pPr>
+                <a:defRPr/>
+              </a:pPr>
+              <a:t>2</a:t>
+            </a:fld>
+            <a:endParaRPr lang="en-US"/>
+          </a:p>
+        </p:txBody>
+      </p:sp>
+    </p:spTree>
+    <p:extLst>
+      <p:ext uri="{BB962C8B-B14F-4D97-AF65-F5344CB8AC3E}">
+        <p14:creationId xmlns:p14="http://schemas.microsoft.com/office/powerpoint/2010/main" val="3135229213"/>
+      </p:ext>
+    </p:extLst>
+  </p:cSld>
+  <p:clrMapOvr>
+    <a:masterClrMapping/>
+  </p:clrMapOvr>
+</p:notes>
+</file>
+
+<file path=ppt/notesSlides/notesSlide20.xml><?xml version="1.0" encoding="utf-8"?>
+<p:notes xmlns:a="http://schemas.openxmlformats.org/drawingml/2006/main" xmlns:r="http://schemas.openxmlformats.org/officeDocument/2006/relationships" xmlns:p="http://schemas.openxmlformats.org/presentationml/2006/main">
+  <p:cSld>
+    <p:spTree>
+      <p:nvGrpSpPr>
+        <p:cNvPr id="1" name=""/>
+        <p:cNvGrpSpPr/>
+        <p:nvPr/>
+      </p:nvGrpSpPr>
+      <p:grpSpPr>
+        <a:xfrm>
+          <a:off x="0" y="0"/>
+          <a:ext cx="0" cy="0"/>
+          <a:chOff x="0" y="0"/>
+          <a:chExt cx="0" cy="0"/>
+        </a:xfrm>
+      </p:grpSpPr>
+      <p:sp>
+        <p:nvSpPr>
+          <p:cNvPr id="2" name="Slide Image Placeholder 1"/>
+          <p:cNvSpPr>
+            <a:spLocks noGrp="1" noRot="1" noChangeAspect="1"/>
+          </p:cNvSpPr>
+          <p:nvPr>
+            <p:ph type="sldImg"/>
+          </p:nvPr>
+        </p:nvSpPr>
+        <p:spPr/>
+      </p:sp>
+      <p:sp>
+        <p:nvSpPr>
+          <p:cNvPr id="3" name="Notes Placeholder 2"/>
+          <p:cNvSpPr>
+            <a:spLocks noGrp="1"/>
+          </p:cNvSpPr>
+          <p:nvPr>
+            <p:ph type="body" idx="1"/>
+          </p:nvPr>
+        </p:nvSpPr>
+        <p:spPr/>
+        <p:txBody>
+          <a:bodyPr/>
+          <a:lstStyle/>
+          <a:p>
+            <a:endParaRPr lang="en-US"/>
+          </a:p>
+        </p:txBody>
+      </p:sp>
+      <p:sp>
+        <p:nvSpPr>
+          <p:cNvPr id="4" name="Slide Number Placeholder 3"/>
+          <p:cNvSpPr>
+            <a:spLocks noGrp="1"/>
+          </p:cNvSpPr>
+          <p:nvPr>
+            <p:ph type="sldNum" sz="quarter" idx="10"/>
+          </p:nvPr>
+        </p:nvSpPr>
+        <p:spPr/>
+        <p:txBody>
+          <a:bodyPr/>
+          <a:lstStyle/>
+          <a:p>
+            <a:pPr>
+              <a:defRPr/>
+            </a:pPr>
+            <a:fld id="{F3969550-FBCF-404B-9FAA-7B1DCDF2C4FF}" type="slidenum">
+              <a:rPr lang="en-US" smtClean="0"/>
+              <a:pPr>
+                <a:defRPr/>
+              </a:pPr>
+              <a:t>20</a:t>
+            </a:fld>
+            <a:endParaRPr lang="en-US"/>
+          </a:p>
+        </p:txBody>
+      </p:sp>
+    </p:spTree>
+    <p:extLst>
+      <p:ext uri="{BB962C8B-B14F-4D97-AF65-F5344CB8AC3E}">
+        <p14:creationId xmlns:p14="http://schemas.microsoft.com/office/powerpoint/2010/main" val="417353184"/>
+      </p:ext>
+    </p:extLst>
+  </p:cSld>
+  <p:clrMapOvr>
+    <a:masterClrMapping/>
+  </p:clrMapOvr>
+</p:notes>
+</file>
+
+<file path=ppt/notesSlides/notesSlide21.xml><?xml version="1.0" encoding="utf-8"?>
+<p:notes xmlns:a="http://schemas.openxmlformats.org/drawingml/2006/main" xmlns:r="http://schemas.openxmlformats.org/officeDocument/2006/relationships" xmlns:p="http://schemas.openxmlformats.org/presentationml/2006/main">
+  <p:cSld>
+    <p:spTree>
+      <p:nvGrpSpPr>
+        <p:cNvPr id="1" name=""/>
+        <p:cNvGrpSpPr/>
+        <p:nvPr/>
+      </p:nvGrpSpPr>
+      <p:grpSpPr>
+        <a:xfrm>
+          <a:off x="0" y="0"/>
+          <a:ext cx="0" cy="0"/>
+          <a:chOff x="0" y="0"/>
+          <a:chExt cx="0" cy="0"/>
+        </a:xfrm>
+      </p:grpSpPr>
+      <p:sp>
+        <p:nvSpPr>
+          <p:cNvPr id="2" name="Slide Image Placeholder 1"/>
+          <p:cNvSpPr>
+            <a:spLocks noGrp="1" noRot="1" noChangeAspect="1"/>
+          </p:cNvSpPr>
+          <p:nvPr>
+            <p:ph type="sldImg"/>
+          </p:nvPr>
+        </p:nvSpPr>
+        <p:spPr/>
+      </p:sp>
+      <p:sp>
+        <p:nvSpPr>
+          <p:cNvPr id="3" name="Notes Placeholder 2"/>
+          <p:cNvSpPr>
+            <a:spLocks noGrp="1"/>
+          </p:cNvSpPr>
+          <p:nvPr>
+            <p:ph type="body" idx="1"/>
+          </p:nvPr>
+        </p:nvSpPr>
+        <p:spPr/>
+        <p:txBody>
+          <a:bodyPr/>
+          <a:lstStyle/>
+          <a:p>
+            <a:endParaRPr lang="en-US"/>
+          </a:p>
+        </p:txBody>
+      </p:sp>
+      <p:sp>
+        <p:nvSpPr>
+          <p:cNvPr id="4" name="Slide Number Placeholder 3"/>
+          <p:cNvSpPr>
+            <a:spLocks noGrp="1"/>
+          </p:cNvSpPr>
+          <p:nvPr>
+            <p:ph type="sldNum" sz="quarter" idx="10"/>
+          </p:nvPr>
+        </p:nvSpPr>
+        <p:spPr/>
+        <p:txBody>
+          <a:bodyPr/>
+          <a:lstStyle/>
+          <a:p>
+            <a:pPr>
+              <a:defRPr/>
+            </a:pPr>
+            <a:fld id="{F3969550-FBCF-404B-9FAA-7B1DCDF2C4FF}" type="slidenum">
+              <a:rPr lang="en-US" smtClean="0"/>
+              <a:pPr>
+                <a:defRPr/>
+              </a:pPr>
+              <a:t>21</a:t>
+            </a:fld>
+            <a:endParaRPr lang="en-US"/>
+          </a:p>
+        </p:txBody>
+      </p:sp>
+    </p:spTree>
+    <p:extLst>
+      <p:ext uri="{BB962C8B-B14F-4D97-AF65-F5344CB8AC3E}">
+        <p14:creationId xmlns:p14="http://schemas.microsoft.com/office/powerpoint/2010/main" val="4044608778"/>
+      </p:ext>
+    </p:extLst>
+  </p:cSld>
+  <p:clrMapOvr>
+    <a:masterClrMapping/>
+  </p:clrMapOvr>
+</p:notes>
+</file>
+
+<file path=ppt/notesSlides/notesSlide22.xml><?xml version="1.0" encoding="utf-8"?>
+<p:notes xmlns:a="http://schemas.openxmlformats.org/drawingml/2006/main" xmlns:r="http://schemas.openxmlformats.org/officeDocument/2006/relationships" xmlns:p="http://schemas.openxmlformats.org/presentationml/2006/main">
+  <p:cSld>
+    <p:spTree>
+      <p:nvGrpSpPr>
+        <p:cNvPr id="1" name=""/>
+        <p:cNvGrpSpPr/>
+        <p:nvPr/>
+      </p:nvGrpSpPr>
+      <p:grpSpPr>
+        <a:xfrm>
+          <a:off x="0" y="0"/>
+          <a:ext cx="0" cy="0"/>
+          <a:chOff x="0" y="0"/>
+          <a:chExt cx="0" cy="0"/>
+        </a:xfrm>
+      </p:grpSpPr>
+      <p:sp>
+        <p:nvSpPr>
+          <p:cNvPr id="2" name="Slide Image Placeholder 1"/>
+          <p:cNvSpPr>
+            <a:spLocks noGrp="1" noRot="1" noChangeAspect="1"/>
+          </p:cNvSpPr>
+          <p:nvPr>
+            <p:ph type="sldImg"/>
+          </p:nvPr>
+        </p:nvSpPr>
+        <p:spPr/>
+      </p:sp>
+      <p:sp>
+        <p:nvSpPr>
+          <p:cNvPr id="3" name="Notes Placeholder 2"/>
+          <p:cNvSpPr>
+            <a:spLocks noGrp="1"/>
+          </p:cNvSpPr>
+          <p:nvPr>
+            <p:ph type="body" idx="1"/>
+          </p:nvPr>
+        </p:nvSpPr>
+        <p:spPr/>
+        <p:txBody>
+          <a:bodyPr/>
+          <a:lstStyle/>
+          <a:p>
+            <a:endParaRPr lang="en-US"/>
+          </a:p>
+        </p:txBody>
+      </p:sp>
+      <p:sp>
+        <p:nvSpPr>
+          <p:cNvPr id="4" name="Slide Number Placeholder 3"/>
+          <p:cNvSpPr>
+            <a:spLocks noGrp="1"/>
+          </p:cNvSpPr>
+          <p:nvPr>
+            <p:ph type="sldNum" sz="quarter" idx="10"/>
+          </p:nvPr>
+        </p:nvSpPr>
+        <p:spPr/>
+        <p:txBody>
+          <a:bodyPr/>
+          <a:lstStyle/>
+          <a:p>
+            <a:pPr>
+              <a:defRPr/>
+            </a:pPr>
+            <a:fld id="{F3969550-FBCF-404B-9FAA-7B1DCDF2C4FF}" type="slidenum">
+              <a:rPr lang="en-US" smtClean="0"/>
+              <a:pPr>
+                <a:defRPr/>
+              </a:pPr>
+              <a:t>22</a:t>
+            </a:fld>
+            <a:endParaRPr lang="en-US"/>
+          </a:p>
+        </p:txBody>
+      </p:sp>
+    </p:spTree>
+    <p:extLst>
+      <p:ext uri="{BB962C8B-B14F-4D97-AF65-F5344CB8AC3E}">
+        <p14:creationId xmlns:p14="http://schemas.microsoft.com/office/powerpoint/2010/main" val="2237118873"/>
+      </p:ext>
+    </p:extLst>
+  </p:cSld>
+  <p:clrMapOvr>
+    <a:masterClrMapping/>
+  </p:clrMapOvr>
+</p:notes>
+</file>
+
+<file path=ppt/notesSlides/notesSlide23.xml><?xml version="1.0" encoding="utf-8"?>
+<p:notes xmlns:a="http://schemas.openxmlformats.org/drawingml/2006/main" xmlns:r="http://schemas.openxmlformats.org/officeDocument/2006/relationships" xmlns:p="http://schemas.openxmlformats.org/presentationml/2006/main">
+  <p:cSld>
+    <p:spTree>
+      <p:nvGrpSpPr>
+        <p:cNvPr id="1" name=""/>
+        <p:cNvGrpSpPr/>
+        <p:nvPr/>
+      </p:nvGrpSpPr>
+      <p:grpSpPr>
+        <a:xfrm>
+          <a:off x="0" y="0"/>
+          <a:ext cx="0" cy="0"/>
+          <a:chOff x="0" y="0"/>
+          <a:chExt cx="0" cy="0"/>
+        </a:xfrm>
+      </p:grpSpPr>
+      <p:sp>
+        <p:nvSpPr>
+          <p:cNvPr id="2" name="Slide Image Placeholder 1"/>
+          <p:cNvSpPr>
+            <a:spLocks noGrp="1" noRot="1" noChangeAspect="1"/>
+          </p:cNvSpPr>
+          <p:nvPr>
+            <p:ph type="sldImg"/>
+          </p:nvPr>
+        </p:nvSpPr>
+        <p:spPr/>
+      </p:sp>
+      <p:sp>
+        <p:nvSpPr>
+          <p:cNvPr id="3" name="Notes Placeholder 2"/>
+          <p:cNvSpPr>
+            <a:spLocks noGrp="1"/>
+          </p:cNvSpPr>
+          <p:nvPr>
+            <p:ph type="body" idx="1"/>
+          </p:nvPr>
+        </p:nvSpPr>
+        <p:spPr/>
+        <p:txBody>
+          <a:bodyPr/>
+          <a:lstStyle/>
+          <a:p>
+            <a:endParaRPr lang="en-US"/>
+          </a:p>
+        </p:txBody>
+      </p:sp>
+      <p:sp>
+        <p:nvSpPr>
+          <p:cNvPr id="4" name="Slide Number Placeholder 3"/>
+          <p:cNvSpPr>
+            <a:spLocks noGrp="1"/>
+          </p:cNvSpPr>
+          <p:nvPr>
+            <p:ph type="sldNum" sz="quarter" idx="10"/>
+          </p:nvPr>
+        </p:nvSpPr>
+        <p:spPr/>
+        <p:txBody>
+          <a:bodyPr/>
+          <a:lstStyle/>
+          <a:p>
+            <a:pPr>
+              <a:defRPr/>
+            </a:pPr>
+            <a:fld id="{F3969550-FBCF-404B-9FAA-7B1DCDF2C4FF}" type="slidenum">
+              <a:rPr lang="en-US" smtClean="0"/>
+              <a:pPr>
+                <a:defRPr/>
+              </a:pPr>
+              <a:t>23</a:t>
+            </a:fld>
+            <a:endParaRPr lang="en-US"/>
+          </a:p>
+        </p:txBody>
+      </p:sp>
+    </p:spTree>
+    <p:extLst>
+      <p:ext uri="{BB962C8B-B14F-4D97-AF65-F5344CB8AC3E}">
+        <p14:creationId xmlns:p14="http://schemas.microsoft.com/office/powerpoint/2010/main" val="1145980166"/>
+      </p:ext>
+    </p:extLst>
+  </p:cSld>
+  <p:clrMapOvr>
+    <a:masterClrMapping/>
+  </p:clrMapOvr>
+</p:notes>
+</file>
+
+<file path=ppt/notesSlides/notesSlide24.xml><?xml version="1.0" encoding="utf-8"?>
+<p:notes xmlns:a="http://schemas.openxmlformats.org/drawingml/2006/main" xmlns:r="http://schemas.openxmlformats.org/officeDocument/2006/relationships" xmlns:p="http://schemas.openxmlformats.org/presentationml/2006/main">
+  <p:cSld>
+    <p:spTree>
+      <p:nvGrpSpPr>
+        <p:cNvPr id="1" name=""/>
+        <p:cNvGrpSpPr/>
+        <p:nvPr/>
+      </p:nvGrpSpPr>
+      <p:grpSpPr>
+        <a:xfrm>
+          <a:off x="0" y="0"/>
+          <a:ext cx="0" cy="0"/>
+          <a:chOff x="0" y="0"/>
+          <a:chExt cx="0" cy="0"/>
+        </a:xfrm>
+      </p:grpSpPr>
+      <p:sp>
+        <p:nvSpPr>
+          <p:cNvPr id="2" name="Slide Image Placeholder 1"/>
+          <p:cNvSpPr>
+            <a:spLocks noGrp="1" noRot="1" noChangeAspect="1"/>
+          </p:cNvSpPr>
+          <p:nvPr>
+            <p:ph type="sldImg"/>
+          </p:nvPr>
+        </p:nvSpPr>
+        <p:spPr/>
+      </p:sp>
+      <p:sp>
+        <p:nvSpPr>
+          <p:cNvPr id="3" name="Notes Placeholder 2"/>
+          <p:cNvSpPr>
+            <a:spLocks noGrp="1"/>
+          </p:cNvSpPr>
+          <p:nvPr>
+            <p:ph type="body" idx="1"/>
+          </p:nvPr>
+        </p:nvSpPr>
+        <p:spPr/>
+        <p:txBody>
+          <a:bodyPr/>
+          <a:lstStyle/>
+          <a:p>
+            <a:endParaRPr lang="en-US"/>
+          </a:p>
+        </p:txBody>
+      </p:sp>
+      <p:sp>
+        <p:nvSpPr>
+          <p:cNvPr id="4" name="Slide Number Placeholder 3"/>
+          <p:cNvSpPr>
+            <a:spLocks noGrp="1"/>
+          </p:cNvSpPr>
+          <p:nvPr>
+            <p:ph type="sldNum" sz="quarter" idx="10"/>
+          </p:nvPr>
+        </p:nvSpPr>
+        <p:spPr/>
+        <p:txBody>
+          <a:bodyPr/>
+          <a:lstStyle/>
+          <a:p>
+            <a:pPr>
+              <a:defRPr/>
+            </a:pPr>
+            <a:fld id="{F3969550-FBCF-404B-9FAA-7B1DCDF2C4FF}" type="slidenum">
+              <a:rPr lang="en-US" smtClean="0"/>
+              <a:pPr>
+                <a:defRPr/>
+              </a:pPr>
+              <a:t>24</a:t>
+            </a:fld>
+            <a:endParaRPr lang="en-US"/>
+          </a:p>
+        </p:txBody>
+      </p:sp>
+    </p:spTree>
+    <p:extLst>
+      <p:ext uri="{BB962C8B-B14F-4D97-AF65-F5344CB8AC3E}">
+        <p14:creationId xmlns:p14="http://schemas.microsoft.com/office/powerpoint/2010/main" val="845994569"/>
+      </p:ext>
+    </p:extLst>
+  </p:cSld>
+  <p:clrMapOvr>
+    <a:masterClrMapping/>
+  </p:clrMapOvr>
+</p:notes>
+</file>
+
+<file path=ppt/notesSlides/notesSlide25.xml><?xml version="1.0" encoding="utf-8"?>
+<p:notes xmlns:a="http://schemas.openxmlformats.org/drawingml/2006/main" xmlns:r="http://schemas.openxmlformats.org/officeDocument/2006/relationships" xmlns:p="http://schemas.openxmlformats.org/presentationml/2006/main">
+  <p:cSld>
+    <p:spTree>
+      <p:nvGrpSpPr>
+        <p:cNvPr id="1" name=""/>
+        <p:cNvGrpSpPr/>
+        <p:nvPr/>
+      </p:nvGrpSpPr>
+      <p:grpSpPr>
+        <a:xfrm>
+          <a:off x="0" y="0"/>
+          <a:ext cx="0" cy="0"/>
+          <a:chOff x="0" y="0"/>
+          <a:chExt cx="0" cy="0"/>
+        </a:xfrm>
+      </p:grpSpPr>
+      <p:sp>
+        <p:nvSpPr>
+          <p:cNvPr id="2" name="Slide Image Placeholder 1"/>
+          <p:cNvSpPr>
+            <a:spLocks noGrp="1" noRot="1" noChangeAspect="1"/>
+          </p:cNvSpPr>
+          <p:nvPr>
+            <p:ph type="sldImg"/>
+          </p:nvPr>
+        </p:nvSpPr>
+        <p:spPr/>
+      </p:sp>
+      <p:sp>
+        <p:nvSpPr>
+          <p:cNvPr id="3" name="Notes Placeholder 2"/>
+          <p:cNvSpPr>
+            <a:spLocks noGrp="1"/>
+          </p:cNvSpPr>
+          <p:nvPr>
+            <p:ph type="body" idx="1"/>
+          </p:nvPr>
+        </p:nvSpPr>
+        <p:spPr/>
+        <p:txBody>
+          <a:bodyPr/>
+          <a:lstStyle/>
+          <a:p>
+            <a:endParaRPr lang="en-US"/>
+          </a:p>
+        </p:txBody>
+      </p:sp>
+      <p:sp>
+        <p:nvSpPr>
+          <p:cNvPr id="4" name="Slide Number Placeholder 3"/>
+          <p:cNvSpPr>
+            <a:spLocks noGrp="1"/>
+          </p:cNvSpPr>
+          <p:nvPr>
+            <p:ph type="sldNum" sz="quarter" idx="10"/>
+          </p:nvPr>
+        </p:nvSpPr>
+        <p:spPr/>
+        <p:txBody>
+          <a:bodyPr/>
+          <a:lstStyle/>
+          <a:p>
+            <a:pPr>
+              <a:defRPr/>
+            </a:pPr>
+            <a:fld id="{F3969550-FBCF-404B-9FAA-7B1DCDF2C4FF}" type="slidenum">
+              <a:rPr lang="en-US" smtClean="0"/>
+              <a:pPr>
+                <a:defRPr/>
+              </a:pPr>
+              <a:t>25</a:t>
+            </a:fld>
+            <a:endParaRPr lang="en-US"/>
+          </a:p>
+        </p:txBody>
+      </p:sp>
+    </p:spTree>
+    <p:extLst>
+      <p:ext uri="{BB962C8B-B14F-4D97-AF65-F5344CB8AC3E}">
+        <p14:creationId xmlns:p14="http://schemas.microsoft.com/office/powerpoint/2010/main" val="3299727051"/>
+      </p:ext>
+    </p:extLst>
+  </p:cSld>
+  <p:clrMapOvr>
+    <a:masterClrMapping/>
+  </p:clrMapOvr>
+</p:notes>
+</file>
+
+<file path=ppt/notesSlides/notesSlide26.xml><?xml version="1.0" encoding="utf-8"?>
+<p:notes xmlns:a="http://schemas.openxmlformats.org/drawingml/2006/main" xmlns:r="http://schemas.openxmlformats.org/officeDocument/2006/relationships" xmlns:p="http://schemas.openxmlformats.org/presentationml/2006/main">
+  <p:cSld>
+    <p:spTree>
+      <p:nvGrpSpPr>
+        <p:cNvPr id="1" name=""/>
+        <p:cNvGrpSpPr/>
+        <p:nvPr/>
+      </p:nvGrpSpPr>
+      <p:grpSpPr>
+        <a:xfrm>
+          <a:off x="0" y="0"/>
+          <a:ext cx="0" cy="0"/>
+          <a:chOff x="0" y="0"/>
+          <a:chExt cx="0" cy="0"/>
+        </a:xfrm>
+      </p:grpSpPr>
+      <p:sp>
+        <p:nvSpPr>
+          <p:cNvPr id="2" name="Slide Image Placeholder 1"/>
+          <p:cNvSpPr>
+            <a:spLocks noGrp="1" noRot="1" noChangeAspect="1"/>
+          </p:cNvSpPr>
+          <p:nvPr>
+            <p:ph type="sldImg"/>
+          </p:nvPr>
+        </p:nvSpPr>
+        <p:spPr/>
+      </p:sp>
+      <p:sp>
+        <p:nvSpPr>
+          <p:cNvPr id="3" name="Notes Placeholder 2"/>
+          <p:cNvSpPr>
+            <a:spLocks noGrp="1"/>
+          </p:cNvSpPr>
+          <p:nvPr>
+            <p:ph type="body" idx="1"/>
+          </p:nvPr>
+        </p:nvSpPr>
+        <p:spPr/>
+        <p:txBody>
+          <a:bodyPr/>
+          <a:lstStyle/>
+          <a:p>
+            <a:endParaRPr lang="en-US"/>
+          </a:p>
+        </p:txBody>
+      </p:sp>
+      <p:sp>
+        <p:nvSpPr>
+          <p:cNvPr id="4" name="Slide Number Placeholder 3"/>
+          <p:cNvSpPr>
+            <a:spLocks noGrp="1"/>
+          </p:cNvSpPr>
+          <p:nvPr>
+            <p:ph type="sldNum" sz="quarter" idx="10"/>
+          </p:nvPr>
+        </p:nvSpPr>
+        <p:spPr/>
+        <p:txBody>
+          <a:bodyPr/>
+          <a:lstStyle/>
+          <a:p>
+            <a:pPr>
+              <a:defRPr/>
+            </a:pPr>
+            <a:fld id="{F3969550-FBCF-404B-9FAA-7B1DCDF2C4FF}" type="slidenum">
+              <a:rPr lang="en-US" smtClean="0"/>
+              <a:pPr>
+                <a:defRPr/>
+              </a:pPr>
+              <a:t>26</a:t>
+            </a:fld>
+            <a:endParaRPr lang="en-US"/>
+          </a:p>
+        </p:txBody>
+      </p:sp>
+    </p:spTree>
+    <p:extLst>
+      <p:ext uri="{BB962C8B-B14F-4D97-AF65-F5344CB8AC3E}">
+        <p14:creationId xmlns:p14="http://schemas.microsoft.com/office/powerpoint/2010/main" val="1504748977"/>
+      </p:ext>
+    </p:extLst>
+  </p:cSld>
+  <p:clrMapOvr>
+    <a:masterClrMapping/>
+  </p:clrMapOvr>
+</p:notes>
+</file>
+
+<file path=ppt/notesSlides/notesSlide3.xml><?xml version="1.0" encoding="utf-8"?>
+<p:notes xmlns:a="http://schemas.openxmlformats.org/drawingml/2006/main" xmlns:r="http://schemas.openxmlformats.org/officeDocument/2006/relationships" xmlns:p="http://schemas.openxmlformats.org/presentationml/2006/main">
+  <p:cSld>
+    <p:spTree>
+      <p:nvGrpSpPr>
+        <p:cNvPr id="1" name=""/>
+        <p:cNvGrpSpPr/>
+        <p:nvPr/>
+      </p:nvGrpSpPr>
+      <p:grpSpPr>
+        <a:xfrm>
+          <a:off x="0" y="0"/>
+          <a:ext cx="0" cy="0"/>
+          <a:chOff x="0" y="0"/>
+          <a:chExt cx="0" cy="0"/>
+        </a:xfrm>
+      </p:grpSpPr>
+      <p:sp>
+        <p:nvSpPr>
+          <p:cNvPr id="2" name="Slide Image Placeholder 1"/>
+          <p:cNvSpPr>
+            <a:spLocks noGrp="1" noRot="1" noChangeAspect="1"/>
+          </p:cNvSpPr>
+          <p:nvPr>
+            <p:ph type="sldImg"/>
+          </p:nvPr>
+        </p:nvSpPr>
+        <p:spPr/>
+      </p:sp>
+      <p:sp>
+        <p:nvSpPr>
+          <p:cNvPr id="3" name="Notes Placeholder 2"/>
+          <p:cNvSpPr>
+            <a:spLocks noGrp="1"/>
+          </p:cNvSpPr>
+          <p:nvPr>
+            <p:ph type="body" idx="1"/>
+          </p:nvPr>
+        </p:nvSpPr>
+        <p:spPr/>
+        <p:txBody>
+          <a:bodyPr/>
+          <a:lstStyle/>
+          <a:p>
+            <a:endParaRPr lang="en-US"/>
+          </a:p>
+        </p:txBody>
+      </p:sp>
+      <p:sp>
+        <p:nvSpPr>
+          <p:cNvPr id="4" name="Slide Number Placeholder 3"/>
+          <p:cNvSpPr>
+            <a:spLocks noGrp="1"/>
+          </p:cNvSpPr>
+          <p:nvPr>
+            <p:ph type="sldNum" sz="quarter" idx="10"/>
+          </p:nvPr>
+        </p:nvSpPr>
+        <p:spPr/>
+        <p:txBody>
+          <a:bodyPr/>
+          <a:lstStyle/>
+          <a:p>
+            <a:pPr>
+              <a:defRPr/>
+            </a:pPr>
+            <a:fld id="{F3969550-FBCF-404B-9FAA-7B1DCDF2C4FF}" type="slidenum">
+              <a:rPr lang="en-US" smtClean="0"/>
+              <a:pPr>
+                <a:defRPr/>
+              </a:pPr>
+              <a:t>3</a:t>
+            </a:fld>
+            <a:endParaRPr lang="en-US"/>
+          </a:p>
+        </p:txBody>
+      </p:sp>
+    </p:spTree>
+    <p:extLst>
+      <p:ext uri="{BB962C8B-B14F-4D97-AF65-F5344CB8AC3E}">
+        <p14:creationId xmlns:p14="http://schemas.microsoft.com/office/powerpoint/2010/main" val="2341939900"/>
+      </p:ext>
+    </p:extLst>
+  </p:cSld>
+  <p:clrMapOvr>
+    <a:masterClrMapping/>
+  </p:clrMapOvr>
+</p:notes>
+</file>
+
+<file path=ppt/notesSlides/notesSlide4.xml><?xml version="1.0" encoding="utf-8"?>
+<p:notes xmlns:a="http://schemas.openxmlformats.org/drawingml/2006/main" xmlns:r="http://schemas.openxmlformats.org/officeDocument/2006/relationships" xmlns:p="http://schemas.openxmlformats.org/presentationml/2006/main">
+  <p:cSld>
+    <p:spTree>
+      <p:nvGrpSpPr>
+        <p:cNvPr id="1" name=""/>
+        <p:cNvGrpSpPr/>
+        <p:nvPr/>
+      </p:nvGrpSpPr>
+      <p:grpSpPr>
+        <a:xfrm>
+          <a:off x="0" y="0"/>
+          <a:ext cx="0" cy="0"/>
+          <a:chOff x="0" y="0"/>
+          <a:chExt cx="0" cy="0"/>
+        </a:xfrm>
+      </p:grpSpPr>
+      <p:sp>
+        <p:nvSpPr>
+          <p:cNvPr id="2" name="Slide Image Placeholder 1"/>
+          <p:cNvSpPr>
+            <a:spLocks noGrp="1" noRot="1" noChangeAspect="1"/>
+          </p:cNvSpPr>
+          <p:nvPr>
+            <p:ph type="sldImg"/>
+          </p:nvPr>
+        </p:nvSpPr>
+        <p:spPr/>
+      </p:sp>
+      <p:sp>
+        <p:nvSpPr>
+          <p:cNvPr id="3" name="Notes Placeholder 2"/>
+          <p:cNvSpPr>
+            <a:spLocks noGrp="1"/>
+          </p:cNvSpPr>
+          <p:nvPr>
+            <p:ph type="body" idx="1"/>
+          </p:nvPr>
+        </p:nvSpPr>
+        <p:spPr/>
+        <p:txBody>
+          <a:bodyPr/>
+          <a:lstStyle/>
+          <a:p>
+            <a:endParaRPr lang="en-US"/>
+          </a:p>
+        </p:txBody>
+      </p:sp>
+      <p:sp>
+        <p:nvSpPr>
+          <p:cNvPr id="4" name="Slide Number Placeholder 3"/>
+          <p:cNvSpPr>
+            <a:spLocks noGrp="1"/>
+          </p:cNvSpPr>
+          <p:nvPr>
+            <p:ph type="sldNum" sz="quarter" idx="10"/>
+          </p:nvPr>
+        </p:nvSpPr>
+        <p:spPr/>
+        <p:txBody>
+          <a:bodyPr/>
+          <a:lstStyle/>
+          <a:p>
+            <a:pPr>
+              <a:defRPr/>
+            </a:pPr>
+            <a:fld id="{F3969550-FBCF-404B-9FAA-7B1DCDF2C4FF}" type="slidenum">
+              <a:rPr lang="en-US" smtClean="0"/>
+              <a:pPr>
+                <a:defRPr/>
+              </a:pPr>
+              <a:t>4</a:t>
+            </a:fld>
+            <a:endParaRPr lang="en-US"/>
+          </a:p>
+        </p:txBody>
+      </p:sp>
+    </p:spTree>
+    <p:extLst>
+      <p:ext uri="{BB962C8B-B14F-4D97-AF65-F5344CB8AC3E}">
+        <p14:creationId xmlns:p14="http://schemas.microsoft.com/office/powerpoint/2010/main" val="114976252"/>
+      </p:ext>
+    </p:extLst>
+  </p:cSld>
+  <p:clrMapOvr>
+    <a:masterClrMapping/>
+  </p:clrMapOvr>
+</p:notes>
+</file>
+
+<file path=ppt/notesSlides/notesSlide5.xml><?xml version="1.0" encoding="utf-8"?>
+<p:notes xmlns:a="http://schemas.openxmlformats.org/drawingml/2006/main" xmlns:r="http://schemas.openxmlformats.org/officeDocument/2006/relationships" xmlns:p="http://schemas.openxmlformats.org/presentationml/2006/main">
+  <p:cSld>
+    <p:spTree>
+      <p:nvGrpSpPr>
+        <p:cNvPr id="1" name=""/>
+        <p:cNvGrpSpPr/>
+        <p:nvPr/>
+      </p:nvGrpSpPr>
+      <p:grpSpPr>
+        <a:xfrm>
+          <a:off x="0" y="0"/>
+          <a:ext cx="0" cy="0"/>
+          <a:chOff x="0" y="0"/>
+          <a:chExt cx="0" cy="0"/>
+        </a:xfrm>
+      </p:grpSpPr>
+      <p:sp>
+        <p:nvSpPr>
+          <p:cNvPr id="2" name="Slide Image Placeholder 1"/>
+          <p:cNvSpPr>
+            <a:spLocks noGrp="1" noRot="1" noChangeAspect="1"/>
+          </p:cNvSpPr>
+          <p:nvPr>
+            <p:ph type="sldImg"/>
+          </p:nvPr>
+        </p:nvSpPr>
+        <p:spPr/>
+      </p:sp>
+      <p:sp>
+        <p:nvSpPr>
+          <p:cNvPr id="3" name="Notes Placeholder 2"/>
+          <p:cNvSpPr>
+            <a:spLocks noGrp="1"/>
+          </p:cNvSpPr>
+          <p:nvPr>
+            <p:ph type="body" idx="1"/>
+          </p:nvPr>
+        </p:nvSpPr>
+        <p:spPr/>
+        <p:txBody>
+          <a:bodyPr/>
+          <a:lstStyle/>
+          <a:p>
+            <a:endParaRPr lang="en-US"/>
+          </a:p>
+        </p:txBody>
+      </p:sp>
+      <p:sp>
+        <p:nvSpPr>
+          <p:cNvPr id="4" name="Slide Number Placeholder 3"/>
+          <p:cNvSpPr>
+            <a:spLocks noGrp="1"/>
+          </p:cNvSpPr>
+          <p:nvPr>
+            <p:ph type="sldNum" sz="quarter" idx="10"/>
+          </p:nvPr>
+        </p:nvSpPr>
+        <p:spPr/>
+        <p:txBody>
+          <a:bodyPr/>
+          <a:lstStyle/>
+          <a:p>
+            <a:pPr>
+              <a:defRPr/>
+            </a:pPr>
+            <a:fld id="{F3969550-FBCF-404B-9FAA-7B1DCDF2C4FF}" type="slidenum">
+              <a:rPr lang="en-US" smtClean="0"/>
+              <a:pPr>
+                <a:defRPr/>
+              </a:pPr>
+              <a:t>5</a:t>
+            </a:fld>
+            <a:endParaRPr lang="en-US"/>
+          </a:p>
+        </p:txBody>
+      </p:sp>
+    </p:spTree>
+    <p:extLst>
+      <p:ext uri="{BB962C8B-B14F-4D97-AF65-F5344CB8AC3E}">
+        <p14:creationId xmlns:p14="http://schemas.microsoft.com/office/powerpoint/2010/main" val="846872129"/>
+      </p:ext>
+    </p:extLst>
+  </p:cSld>
+  <p:clrMapOvr>
+    <a:masterClrMapping/>
+  </p:clrMapOvr>
+</p:notes>
+</file>
+
+<file path=ppt/notesSlides/notesSlide6.xml><?xml version="1.0" encoding="utf-8"?>
+<p:notes xmlns:a="http://schemas.openxmlformats.org/drawingml/2006/main" xmlns:r="http://schemas.openxmlformats.org/officeDocument/2006/relationships" xmlns:p="http://schemas.openxmlformats.org/presentationml/2006/main">
+  <p:cSld>
     <p:bg>
       <p:bgPr>
         <a:solidFill>
@@ -1104,6 +3084,276 @@
         </p:txBody>
       </p:sp>
     </p:spTree>
+  </p:cSld>
+  <p:clrMapOvr>
+    <a:masterClrMapping/>
+  </p:clrMapOvr>
+</p:notes>
+</file>
+
+<file path=ppt/notesSlides/notesSlide7.xml><?xml version="1.0" encoding="utf-8"?>
+<p:notes xmlns:a="http://schemas.openxmlformats.org/drawingml/2006/main" xmlns:r="http://schemas.openxmlformats.org/officeDocument/2006/relationships" xmlns:p="http://schemas.openxmlformats.org/presentationml/2006/main">
+  <p:cSld>
+    <p:spTree>
+      <p:nvGrpSpPr>
+        <p:cNvPr id="1" name=""/>
+        <p:cNvGrpSpPr/>
+        <p:nvPr/>
+      </p:nvGrpSpPr>
+      <p:grpSpPr>
+        <a:xfrm>
+          <a:off x="0" y="0"/>
+          <a:ext cx="0" cy="0"/>
+          <a:chOff x="0" y="0"/>
+          <a:chExt cx="0" cy="0"/>
+        </a:xfrm>
+      </p:grpSpPr>
+      <p:sp>
+        <p:nvSpPr>
+          <p:cNvPr id="2" name="Slide Image Placeholder 1"/>
+          <p:cNvSpPr>
+            <a:spLocks noGrp="1" noRot="1" noChangeAspect="1"/>
+          </p:cNvSpPr>
+          <p:nvPr>
+            <p:ph type="sldImg"/>
+          </p:nvPr>
+        </p:nvSpPr>
+        <p:spPr/>
+      </p:sp>
+      <p:sp>
+        <p:nvSpPr>
+          <p:cNvPr id="3" name="Notes Placeholder 2"/>
+          <p:cNvSpPr>
+            <a:spLocks noGrp="1"/>
+          </p:cNvSpPr>
+          <p:nvPr>
+            <p:ph type="body" idx="1"/>
+          </p:nvPr>
+        </p:nvSpPr>
+        <p:spPr/>
+        <p:txBody>
+          <a:bodyPr/>
+          <a:lstStyle/>
+          <a:p>
+            <a:endParaRPr lang="en-US"/>
+          </a:p>
+        </p:txBody>
+      </p:sp>
+      <p:sp>
+        <p:nvSpPr>
+          <p:cNvPr id="4" name="Slide Number Placeholder 3"/>
+          <p:cNvSpPr>
+            <a:spLocks noGrp="1"/>
+          </p:cNvSpPr>
+          <p:nvPr>
+            <p:ph type="sldNum" sz="quarter" idx="10"/>
+          </p:nvPr>
+        </p:nvSpPr>
+        <p:spPr/>
+        <p:txBody>
+          <a:bodyPr/>
+          <a:lstStyle/>
+          <a:p>
+            <a:pPr>
+              <a:defRPr/>
+            </a:pPr>
+            <a:fld id="{F3969550-FBCF-404B-9FAA-7B1DCDF2C4FF}" type="slidenum">
+              <a:rPr lang="en-US" smtClean="0"/>
+              <a:pPr>
+                <a:defRPr/>
+              </a:pPr>
+              <a:t>7</a:t>
+            </a:fld>
+            <a:endParaRPr lang="en-US"/>
+          </a:p>
+        </p:txBody>
+      </p:sp>
+    </p:spTree>
+    <p:extLst>
+      <p:ext uri="{BB962C8B-B14F-4D97-AF65-F5344CB8AC3E}">
+        <p14:creationId xmlns:p14="http://schemas.microsoft.com/office/powerpoint/2010/main" val="3672209204"/>
+      </p:ext>
+    </p:extLst>
+  </p:cSld>
+  <p:clrMapOvr>
+    <a:masterClrMapping/>
+  </p:clrMapOvr>
+</p:notes>
+</file>
+
+<file path=ppt/notesSlides/notesSlide8.xml><?xml version="1.0" encoding="utf-8"?>
+<p:notes xmlns:a="http://schemas.openxmlformats.org/drawingml/2006/main" xmlns:r="http://schemas.openxmlformats.org/officeDocument/2006/relationships" xmlns:p="http://schemas.openxmlformats.org/presentationml/2006/main">
+  <p:cSld>
+    <p:spTree>
+      <p:nvGrpSpPr>
+        <p:cNvPr id="1" name=""/>
+        <p:cNvGrpSpPr/>
+        <p:nvPr/>
+      </p:nvGrpSpPr>
+      <p:grpSpPr>
+        <a:xfrm>
+          <a:off x="0" y="0"/>
+          <a:ext cx="0" cy="0"/>
+          <a:chOff x="0" y="0"/>
+          <a:chExt cx="0" cy="0"/>
+        </a:xfrm>
+      </p:grpSpPr>
+      <p:sp>
+        <p:nvSpPr>
+          <p:cNvPr id="2" name="Slide Image Placeholder 1"/>
+          <p:cNvSpPr>
+            <a:spLocks noGrp="1" noRot="1" noChangeAspect="1"/>
+          </p:cNvSpPr>
+          <p:nvPr>
+            <p:ph type="sldImg"/>
+          </p:nvPr>
+        </p:nvSpPr>
+        <p:spPr/>
+      </p:sp>
+      <p:sp>
+        <p:nvSpPr>
+          <p:cNvPr id="3" name="Notes Placeholder 2"/>
+          <p:cNvSpPr>
+            <a:spLocks noGrp="1"/>
+          </p:cNvSpPr>
+          <p:nvPr>
+            <p:ph type="body" idx="1"/>
+          </p:nvPr>
+        </p:nvSpPr>
+        <p:spPr/>
+        <p:txBody>
+          <a:bodyPr/>
+          <a:lstStyle/>
+          <a:p>
+            <a:endParaRPr lang="en-US"/>
+          </a:p>
+        </p:txBody>
+      </p:sp>
+      <p:sp>
+        <p:nvSpPr>
+          <p:cNvPr id="4" name="Slide Number Placeholder 3"/>
+          <p:cNvSpPr>
+            <a:spLocks noGrp="1"/>
+          </p:cNvSpPr>
+          <p:nvPr>
+            <p:ph type="sldNum" sz="quarter" idx="10"/>
+          </p:nvPr>
+        </p:nvSpPr>
+        <p:spPr/>
+        <p:txBody>
+          <a:bodyPr/>
+          <a:lstStyle/>
+          <a:p>
+            <a:pPr>
+              <a:defRPr/>
+            </a:pPr>
+            <a:fld id="{F3969550-FBCF-404B-9FAA-7B1DCDF2C4FF}" type="slidenum">
+              <a:rPr lang="en-US" smtClean="0"/>
+              <a:pPr>
+                <a:defRPr/>
+              </a:pPr>
+              <a:t>8</a:t>
+            </a:fld>
+            <a:endParaRPr lang="en-US"/>
+          </a:p>
+        </p:txBody>
+      </p:sp>
+    </p:spTree>
+    <p:extLst>
+      <p:ext uri="{BB962C8B-B14F-4D97-AF65-F5344CB8AC3E}">
+        <p14:creationId xmlns:p14="http://schemas.microsoft.com/office/powerpoint/2010/main" val="1498537056"/>
+      </p:ext>
+    </p:extLst>
+  </p:cSld>
+  <p:clrMapOvr>
+    <a:masterClrMapping/>
+  </p:clrMapOvr>
+</p:notes>
+</file>
+
+<file path=ppt/notesSlides/notesSlide9.xml><?xml version="1.0" encoding="utf-8"?>
+<p:notes xmlns:a="http://schemas.openxmlformats.org/drawingml/2006/main" xmlns:r="http://schemas.openxmlformats.org/officeDocument/2006/relationships" xmlns:p="http://schemas.openxmlformats.org/presentationml/2006/main">
+  <p:cSld>
+    <p:spTree>
+      <p:nvGrpSpPr>
+        <p:cNvPr id="1" name=""/>
+        <p:cNvGrpSpPr/>
+        <p:nvPr/>
+      </p:nvGrpSpPr>
+      <p:grpSpPr>
+        <a:xfrm>
+          <a:off x="0" y="0"/>
+          <a:ext cx="0" cy="0"/>
+          <a:chOff x="0" y="0"/>
+          <a:chExt cx="0" cy="0"/>
+        </a:xfrm>
+      </p:grpSpPr>
+      <p:sp>
+        <p:nvSpPr>
+          <p:cNvPr id="2" name="Slide Image Placeholder 1"/>
+          <p:cNvSpPr>
+            <a:spLocks noGrp="1" noRot="1" noChangeAspect="1"/>
+          </p:cNvSpPr>
+          <p:nvPr>
+            <p:ph type="sldImg"/>
+          </p:nvPr>
+        </p:nvSpPr>
+        <p:spPr/>
+      </p:sp>
+      <p:sp>
+        <p:nvSpPr>
+          <p:cNvPr id="3" name="Notes Placeholder 2"/>
+          <p:cNvSpPr>
+            <a:spLocks noGrp="1"/>
+          </p:cNvSpPr>
+          <p:nvPr>
+            <p:ph type="body" idx="1"/>
+          </p:nvPr>
+        </p:nvSpPr>
+        <p:spPr/>
+        <p:txBody>
+          <a:bodyPr/>
+          <a:lstStyle/>
+          <a:p>
+            <a:endParaRPr lang="en-US"/>
+          </a:p>
+        </p:txBody>
+      </p:sp>
+      <p:sp>
+        <p:nvSpPr>
+          <p:cNvPr id="4" name="Slide Number Placeholder 3"/>
+          <p:cNvSpPr>
+            <a:spLocks noGrp="1"/>
+          </p:cNvSpPr>
+          <p:nvPr>
+            <p:ph type="sldNum" sz="quarter" idx="10"/>
+          </p:nvPr>
+        </p:nvSpPr>
+        <p:spPr/>
+        <p:txBody>
+          <a:bodyPr/>
+          <a:lstStyle/>
+          <a:p>
+            <a:pPr>
+              <a:defRPr/>
+            </a:pPr>
+            <a:fld id="{F3969550-FBCF-404B-9FAA-7B1DCDF2C4FF}" type="slidenum">
+              <a:rPr lang="en-US" smtClean="0"/>
+              <a:pPr>
+                <a:defRPr/>
+              </a:pPr>
+              <a:t>9</a:t>
+            </a:fld>
+            <a:endParaRPr lang="en-US"/>
+          </a:p>
+        </p:txBody>
+      </p:sp>
+    </p:spTree>
+    <p:extLst>
+      <p:ext uri="{BB962C8B-B14F-4D97-AF65-F5344CB8AC3E}">
+        <p14:creationId xmlns:p14="http://schemas.microsoft.com/office/powerpoint/2010/main" val="3826412533"/>
+      </p:ext>
+    </p:extLst>
   </p:cSld>
   <p:clrMapOvr>
     <a:masterClrMapping/>
@@ -3590,7 +5840,7 @@
               <a:pPr>
                 <a:defRPr/>
               </a:pPr>
-              <a:t>6/3/15</a:t>
+              <a:t>6/8/15</a:t>
             </a:fld>
             <a:endParaRPr lang="en-US"/>
           </a:p>
@@ -4165,7 +6415,7 @@
           <p:nvPr/>
         </p:nvPicPr>
         <p:blipFill>
-          <a:blip r:embed="rId2">
+          <a:blip r:embed="rId3">
             <a:extLst>
               <a:ext uri="{28A0092B-C50C-407E-A947-70E740481C1C}">
                 <a14:useLocalDpi xmlns:a14="http://schemas.microsoft.com/office/drawing/2010/main" val="0"/>
@@ -4565,7 +6815,7 @@
             <a:r>
               <a:rPr lang="en-US">
                 <a:ea typeface="ＭＳ Ｐゴシック" charset="0"/>
-                <a:hlinkClick r:id="rId2"/>
+                <a:hlinkClick r:id="rId3"/>
               </a:rPr>
               <a:t>http://www.biostars.org/p/70204/</a:t>
             </a:r>
@@ -4973,7 +7223,7 @@
             <p:nvPr/>
           </p:nvPicPr>
           <p:blipFill>
-            <a:blip r:embed="rId2">
+            <a:blip r:embed="rId3">
               <a:extLst>
                 <a:ext uri="{28A0092B-C50C-407E-A947-70E740481C1C}">
                   <a14:useLocalDpi xmlns:a14="http://schemas.microsoft.com/office/drawing/2010/main" val="0"/>
@@ -5742,7 +7992,7 @@
               <a:buNone/>
             </a:pPr>
             <a:endParaRPr lang="en-US" dirty="0" smtClean="0">
-              <a:hlinkClick r:id="rId2"/>
+              <a:hlinkClick r:id="rId3"/>
             </a:endParaRPr>
           </a:p>
           <a:p>
@@ -5750,7 +8000,7 @@
               <a:buNone/>
             </a:pPr>
             <a:endParaRPr lang="en-US" dirty="0">
-              <a:hlinkClick r:id="rId2"/>
+              <a:hlinkClick r:id="rId3"/>
             </a:endParaRPr>
           </a:p>
           <a:p>
@@ -5758,7 +8008,7 @@
               <a:buNone/>
             </a:pPr>
             <a:endParaRPr lang="en-US" dirty="0" smtClean="0">
-              <a:hlinkClick r:id="rId2"/>
+              <a:hlinkClick r:id="rId3"/>
             </a:endParaRPr>
           </a:p>
           <a:p>
@@ -5766,7 +8016,7 @@
               <a:buNone/>
             </a:pPr>
             <a:endParaRPr lang="en-US" dirty="0">
-              <a:hlinkClick r:id="rId2"/>
+              <a:hlinkClick r:id="rId3"/>
             </a:endParaRPr>
           </a:p>
           <a:p>
@@ -5775,19 +8025,19 @@
             </a:pPr>
             <a:r>
               <a:rPr lang="en-US" sz="4400" dirty="0" smtClean="0">
-                <a:hlinkClick r:id="rId2"/>
+                <a:hlinkClick r:id="rId3"/>
               </a:rPr>
               <a:t>http</a:t>
             </a:r>
             <a:r>
               <a:rPr lang="en-US" sz="4400" dirty="0">
-                <a:hlinkClick r:id="rId2"/>
+                <a:hlinkClick r:id="rId3"/>
               </a:rPr>
               <a:t>://aws.amazon.com/console</a:t>
             </a:r>
             <a:r>
               <a:rPr lang="en-US" sz="4400" dirty="0" smtClean="0">
-                <a:hlinkClick r:id="rId2"/>
+                <a:hlinkClick r:id="rId3"/>
               </a:rPr>
               <a:t>/</a:t>
             </a:r>
@@ -5847,7 +8097,7 @@
           <p:nvPr/>
         </p:nvPicPr>
         <p:blipFill>
-          <a:blip r:embed="rId2">
+          <a:blip r:embed="rId3">
             <a:extLst>
               <a:ext uri="{28A0092B-C50C-407E-A947-70E740481C1C}">
                 <a14:useLocalDpi xmlns:a14="http://schemas.microsoft.com/office/drawing/2010/main" val="0"/>
@@ -6016,7 +8266,7 @@
               <a:rPr lang="en-US" sz="2800" dirty="0">
                 <a:latin typeface="Calibri"/>
                 <a:cs typeface="Calibri"/>
-                <a:hlinkClick r:id="rId3"/>
+                <a:hlinkClick r:id="rId4"/>
               </a:rPr>
               <a:t>http://bioinformatics.ca/workshop_wiki/index.php</a:t>
             </a:r>
@@ -6024,7 +8274,7 @@
               <a:rPr lang="en-US" sz="2800" dirty="0" smtClean="0">
                 <a:latin typeface="Calibri"/>
                 <a:cs typeface="Calibri"/>
-                <a:hlinkClick r:id="rId3"/>
+                <a:hlinkClick r:id="rId4"/>
               </a:rPr>
               <a:t>/</a:t>
             </a:r>
@@ -6194,7 +8444,7 @@
           <p:nvPr/>
         </p:nvPicPr>
         <p:blipFill>
-          <a:blip r:embed="rId2">
+          <a:blip r:embed="rId3">
             <a:extLst>
               <a:ext uri="{28A0092B-C50C-407E-A947-70E740481C1C}">
                 <a14:useLocalDpi xmlns:a14="http://schemas.microsoft.com/office/drawing/2010/main" val="0"/>
@@ -6341,7 +8591,7 @@
               <a:rPr lang="en-US" sz="2800" dirty="0">
                 <a:latin typeface="Calibri"/>
                 <a:cs typeface="Calibri"/>
-                <a:hlinkClick r:id="rId3"/>
+                <a:hlinkClick r:id="rId4"/>
               </a:rPr>
               <a:t>http://bioinformatics.ca/workshop_wiki/index.php</a:t>
             </a:r>
@@ -6349,7 +8599,7 @@
               <a:rPr lang="en-US" sz="2800" dirty="0" smtClean="0">
                 <a:latin typeface="Calibri"/>
                 <a:cs typeface="Calibri"/>
-                <a:hlinkClick r:id="rId3"/>
+                <a:hlinkClick r:id="rId4"/>
               </a:rPr>
               <a:t>/</a:t>
             </a:r>
@@ -6406,7 +8656,7 @@
           <p:nvPr/>
         </p:nvPicPr>
         <p:blipFill>
-          <a:blip r:embed="rId2">
+          <a:blip r:embed="rId3">
             <a:extLst>
               <a:ext uri="{28A0092B-C50C-407E-A947-70E740481C1C}">
                 <a14:useLocalDpi xmlns:a14="http://schemas.microsoft.com/office/drawing/2010/main" val="0"/>
@@ -6553,7 +8803,7 @@
               <a:rPr lang="en-US" sz="2800" dirty="0">
                 <a:latin typeface="Calibri"/>
                 <a:cs typeface="Calibri"/>
-                <a:hlinkClick r:id="rId3"/>
+                <a:hlinkClick r:id="rId4"/>
               </a:rPr>
               <a:t>http://www.rnaseq.wiki</a:t>
             </a:r>
@@ -6561,7 +8811,7 @@
               <a:rPr lang="en-US" sz="2800" dirty="0" smtClean="0">
                 <a:latin typeface="Calibri"/>
                 <a:cs typeface="Calibri"/>
-                <a:hlinkClick r:id="rId3"/>
+                <a:hlinkClick r:id="rId4"/>
               </a:rPr>
               <a:t>/</a:t>
             </a:r>
@@ -6658,6 +8908,13 @@
   <p:clrMapOvr>
     <a:masterClrMapping/>
   </p:clrMapOvr>
+  <p:timing>
+    <p:tnLst>
+      <p:par>
+        <p:cTn xmlns:p14="http://schemas.microsoft.com/office/powerpoint/2010/main" id="1" dur="indefinite" restart="never" nodeType="tmRoot"/>
+      </p:par>
+    </p:tnLst>
+  </p:timing>
 </p:sld>
 </file>
 
@@ -6716,7 +8973,7 @@
           <p:nvPr/>
         </p:nvPicPr>
         <p:blipFill>
-          <a:blip r:embed="rId2">
+          <a:blip r:embed="rId3">
             <a:extLst>
               <a:ext uri="{28A0092B-C50C-407E-A947-70E740481C1C}">
                 <a14:useLocalDpi xmlns:a14="http://schemas.microsoft.com/office/drawing/2010/main" val="0"/>
@@ -6944,7 +9201,7 @@
           <p:nvPr/>
         </p:nvPicPr>
         <p:blipFill>
-          <a:blip r:embed="rId3">
+          <a:blip r:embed="rId4">
             <a:extLst>
               <a:ext uri="{28A0092B-C50C-407E-A947-70E740481C1C}">
                 <a14:useLocalDpi xmlns:a14="http://schemas.microsoft.com/office/drawing/2010/main" val="0"/>
@@ -8284,7 +10541,7 @@
           </p:nvPr>
         </p:nvPicPr>
         <p:blipFill>
-          <a:blip r:embed="rId2">
+          <a:blip r:embed="rId3">
             <a:extLst>
               <a:ext uri="{28A0092B-C50C-407E-A947-70E740481C1C}">
                 <a14:useLocalDpi xmlns:a14="http://schemas.microsoft.com/office/drawing/2010/main" val="0"/>
@@ -8539,7 +10796,7 @@
           <p:nvPr/>
         </p:nvPicPr>
         <p:blipFill>
-          <a:blip r:embed="rId2">
+          <a:blip r:embed="rId3">
             <a:extLst>
               <a:ext uri="{28A0092B-C50C-407E-A947-70E740481C1C}">
                 <a14:useLocalDpi xmlns:a14="http://schemas.microsoft.com/office/drawing/2010/main" val="0"/>
@@ -8644,7 +10901,7 @@
           <p:nvPr/>
         </p:nvPicPr>
         <p:blipFill>
-          <a:blip r:embed="rId2">
+          <a:blip r:embed="rId3">
             <a:extLst>
               <a:ext uri="{28A0092B-C50C-407E-A947-70E740481C1C}">
                 <a14:useLocalDpi xmlns:a14="http://schemas.microsoft.com/office/drawing/2010/main" val="0"/>
@@ -8714,7 +10971,7 @@
           <p:nvPr/>
         </p:nvPicPr>
         <p:blipFill>
-          <a:blip r:embed="rId3">
+          <a:blip r:embed="rId4">
             <a:extLst>
               <a:ext uri="{28A0092B-C50C-407E-A947-70E740481C1C}">
                 <a14:useLocalDpi xmlns:a14="http://schemas.microsoft.com/office/drawing/2010/main" val="0"/>
@@ -8821,7 +11078,7 @@
           <p:nvPr/>
         </p:nvPicPr>
         <p:blipFill>
-          <a:blip r:embed="rId2">
+          <a:blip r:embed="rId3">
             <a:extLst>
               <a:ext uri="{28A0092B-C50C-407E-A947-70E740481C1C}">
                 <a14:useLocalDpi xmlns:a14="http://schemas.microsoft.com/office/drawing/2010/main" val="0"/>
@@ -8851,7 +11108,7 @@
           <p:nvPr/>
         </p:nvPicPr>
         <p:blipFill rotWithShape="1">
-          <a:blip r:embed="rId3">
+          <a:blip r:embed="rId4">
             <a:extLst>
               <a:ext uri="{28A0092B-C50C-407E-A947-70E740481C1C}">
                 <a14:useLocalDpi xmlns:a14="http://schemas.microsoft.com/office/drawing/2010/main" val="0"/>
@@ -9152,7 +11409,7 @@
           <p:nvPr/>
         </p:nvPicPr>
         <p:blipFill>
-          <a:blip r:embed="rId2">
+          <a:blip r:embed="rId3">
             <a:extLst>
               <a:ext uri="{28A0092B-C50C-407E-A947-70E740481C1C}">
                 <a14:useLocalDpi xmlns:a14="http://schemas.microsoft.com/office/drawing/2010/main" val="0"/>
@@ -9574,6 +11831,13 @@
   <p:clrMapOvr>
     <a:masterClrMapping/>
   </p:clrMapOvr>
+  <p:timing>
+    <p:tnLst>
+      <p:par>
+        <p:cTn xmlns:p14="http://schemas.microsoft.com/office/powerpoint/2010/main" id="1" dur="indefinite" restart="never" nodeType="tmRoot"/>
+      </p:par>
+    </p:tnLst>
+  </p:timing>
 </p:sld>
 </file>
 
@@ -10925,8 +13189,8 @@
               <a:t> </a:t>
             </a:r>
             <a:r>
-              <a:rPr lang="en-CA" sz="2000" dirty="0" err="1"/>
-              <a:t>CBWNY.pem</a:t>
+              <a:rPr lang="en-CA" sz="2000" dirty="0" err="1" smtClean="0"/>
+              <a:t>CBW.pem</a:t>
             </a:r>
             <a:endParaRPr lang="en-CA" sz="2000" dirty="0"/>
           </a:p>
@@ -10941,7 +13205,7 @@
           <p:nvPr/>
         </p:nvPicPr>
         <p:blipFill>
-          <a:blip r:embed="rId2">
+          <a:blip r:embed="rId3">
             <a:extLst>
               <a:ext uri="{28A0092B-C50C-407E-A947-70E740481C1C}">
                 <a14:useLocalDpi xmlns:a14="http://schemas.microsoft.com/office/drawing/2010/main" val="0"/>
@@ -12479,7 +14743,7 @@
           <p:nvPr/>
         </p:nvPicPr>
         <p:blipFill>
-          <a:blip r:embed="rId2">
+          <a:blip r:embed="rId3">
             <a:extLst>
               <a:ext uri="{28A0092B-C50C-407E-A947-70E740481C1C}">
                 <a14:useLocalDpi xmlns:a14="http://schemas.microsoft.com/office/drawing/2010/main" val="0"/>
@@ -15991,14 +18255,7 @@
                 <a:latin typeface="Calibri"/>
                 <a:cs typeface="Calibri"/>
               </a:rPr>
-              <a:t> Lu, Malachi </a:t>
-            </a:r>
-            <a:r>
-              <a:rPr lang="en-US" sz="1600" dirty="0" smtClean="0">
-                <a:latin typeface="Calibri"/>
-                <a:cs typeface="Calibri"/>
-              </a:rPr>
-              <a:t>Griffith &amp; </a:t>
+              <a:t> Lu, Malachi Griffith &amp; </a:t>
             </a:r>
             <a:r>
               <a:rPr lang="en-US" sz="1600" dirty="0">
@@ -16080,7 +18337,7 @@
           <p:nvPr/>
         </p:nvPicPr>
         <p:blipFill>
-          <a:blip r:embed="rId2">
+          <a:blip r:embed="rId3">
             <a:extLst>
               <a:ext uri="{28A0092B-C50C-407E-A947-70E740481C1C}">
                 <a14:useLocalDpi xmlns:a14="http://schemas.microsoft.com/office/drawing/2010/main" val="0"/>
@@ -16110,7 +18367,7 @@
           <p:nvPr/>
         </p:nvPicPr>
         <p:blipFill>
-          <a:blip r:embed="rId3">
+          <a:blip r:embed="rId4">
             <a:extLst>
               <a:ext uri="{28A0092B-C50C-407E-A947-70E740481C1C}">
                 <a14:useLocalDpi xmlns:a14="http://schemas.microsoft.com/office/drawing/2010/main" val="0"/>
@@ -30452,7 +32709,7 @@
           <p:nvPr/>
         </p:nvPicPr>
         <p:blipFill>
-          <a:blip r:embed="rId2">
+          <a:blip r:embed="rId3">
             <a:extLst>
               <a:ext uri="{28A0092B-C50C-407E-A947-70E740481C1C}">
                 <a14:useLocalDpi xmlns:a14="http://schemas.microsoft.com/office/drawing/2010/main" val="0"/>
@@ -30655,7 +32912,7 @@
           <p:nvPr/>
         </p:nvPicPr>
         <p:blipFill>
-          <a:blip r:embed="rId3">
+          <a:blip r:embed="rId4">
             <a:extLst>
               <a:ext uri="{28A0092B-C50C-407E-A947-70E740481C1C}">
                 <a14:useLocalDpi xmlns:a14="http://schemas.microsoft.com/office/drawing/2010/main" val="0"/>

</xml_diff>